<commit_message>
Added phrase "living trompe-l'oeil" to Art&Science slide
</commit_message>
<xml_diff>
--- a/WGCourse/Bonsai On A Budget (running).pptx
+++ b/WGCourse/Bonsai On A Budget (running).pptx
@@ -884,7 +884,7 @@
             <a:fld id="{B61BEF0D-F0BB-DE4B-95CE-6DB70DBA9567}" type="datetimeFigureOut">
               <a:rPr lang="en-US" smtClean="0"/>
               <a:pPr/>
-              <a:t>4/24/2024</a:t>
+              <a:t>6/2/2024</a:t>
             </a:fld>
             <a:endParaRPr lang="en-US" dirty="0"/>
           </a:p>
@@ -1137,7 +1137,7 @@
             <a:fld id="{B61BEF0D-F0BB-DE4B-95CE-6DB70DBA9567}" type="datetimeFigureOut">
               <a:rPr lang="en-US" smtClean="0"/>
               <a:pPr/>
-              <a:t>4/24/2024</a:t>
+              <a:t>6/2/2024</a:t>
             </a:fld>
             <a:endParaRPr lang="en-US" dirty="0"/>
           </a:p>
@@ -1453,7 +1453,7 @@
             <a:fld id="{B61BEF0D-F0BB-DE4B-95CE-6DB70DBA9567}" type="datetimeFigureOut">
               <a:rPr lang="en-US" smtClean="0"/>
               <a:pPr/>
-              <a:t>4/24/2024</a:t>
+              <a:t>6/2/2024</a:t>
             </a:fld>
             <a:endParaRPr lang="en-US" dirty="0"/>
           </a:p>
@@ -1796,7 +1796,7 @@
             <a:fld id="{B61BEF0D-F0BB-DE4B-95CE-6DB70DBA9567}" type="datetimeFigureOut">
               <a:rPr lang="en-US" smtClean="0"/>
               <a:pPr/>
-              <a:t>4/24/2024</a:t>
+              <a:t>6/2/2024</a:t>
             </a:fld>
             <a:endParaRPr lang="en-US" dirty="0"/>
           </a:p>
@@ -2112,7 +2112,7 @@
             <a:fld id="{B61BEF0D-F0BB-DE4B-95CE-6DB70DBA9567}" type="datetimeFigureOut">
               <a:rPr lang="en-US" smtClean="0"/>
               <a:pPr/>
-              <a:t>4/24/2024</a:t>
+              <a:t>6/2/2024</a:t>
             </a:fld>
             <a:endParaRPr lang="en-US" dirty="0"/>
           </a:p>
@@ -2507,7 +2507,7 @@
             <a:fld id="{B61BEF0D-F0BB-DE4B-95CE-6DB70DBA9567}" type="datetimeFigureOut">
               <a:rPr lang="en-US" smtClean="0"/>
               <a:pPr/>
-              <a:t>4/24/2024</a:t>
+              <a:t>6/2/2024</a:t>
             </a:fld>
             <a:endParaRPr lang="en-US" dirty="0"/>
           </a:p>
@@ -2678,7 +2678,7 @@
           <a:p>
             <a:fld id="{55C6B4A9-1611-4792-9094-5F34BCA07E0B}" type="datetimeFigureOut">
               <a:rPr lang="en-US" smtClean="0"/>
-              <a:t>4/24/2024</a:t>
+              <a:t>6/2/2024</a:t>
             </a:fld>
             <a:endParaRPr lang="en-US" dirty="0"/>
           </a:p>
@@ -2859,7 +2859,7 @@
             <a:fld id="{B61BEF0D-F0BB-DE4B-95CE-6DB70DBA9567}" type="datetimeFigureOut">
               <a:rPr lang="en-US" smtClean="0"/>
               <a:pPr/>
-              <a:t>4/24/2024</a:t>
+              <a:t>6/2/2024</a:t>
             </a:fld>
             <a:endParaRPr lang="en-US" dirty="0"/>
           </a:p>
@@ -3037,7 +3037,7 @@
             <a:fld id="{B61BEF0D-F0BB-DE4B-95CE-6DB70DBA9567}" type="datetimeFigureOut">
               <a:rPr lang="en-US" smtClean="0"/>
               <a:pPr/>
-              <a:t>4/24/2024</a:t>
+              <a:t>6/2/2024</a:t>
             </a:fld>
             <a:endParaRPr lang="en-US" dirty="0"/>
           </a:p>
@@ -3286,7 +3286,7 @@
             <a:fld id="{B61BEF0D-F0BB-DE4B-95CE-6DB70DBA9567}" type="datetimeFigureOut">
               <a:rPr lang="en-US" smtClean="0"/>
               <a:pPr/>
-              <a:t>4/24/2024</a:t>
+              <a:t>6/2/2024</a:t>
             </a:fld>
             <a:endParaRPr lang="en-US" dirty="0"/>
           </a:p>
@@ -3519,7 +3519,7 @@
           <a:p>
             <a:fld id="{EB712588-04B1-427B-82EE-E8DB90309F08}" type="datetimeFigureOut">
               <a:rPr lang="en-US" smtClean="0"/>
-              <a:t>4/24/2024</a:t>
+              <a:t>6/2/2024</a:t>
             </a:fld>
             <a:endParaRPr lang="en-US" dirty="0"/>
           </a:p>
@@ -3894,7 +3894,7 @@
             <a:fld id="{B61BEF0D-F0BB-DE4B-95CE-6DB70DBA9567}" type="datetimeFigureOut">
               <a:rPr lang="en-US" smtClean="0"/>
               <a:pPr/>
-              <a:t>4/24/2024</a:t>
+              <a:t>6/2/2024</a:t>
             </a:fld>
             <a:endParaRPr lang="en-US" dirty="0"/>
           </a:p>
@@ -4019,7 +4019,7 @@
             <a:fld id="{B61BEF0D-F0BB-DE4B-95CE-6DB70DBA9567}" type="datetimeFigureOut">
               <a:rPr lang="en-US" smtClean="0"/>
               <a:pPr/>
-              <a:t>4/24/2024</a:t>
+              <a:t>6/2/2024</a:t>
             </a:fld>
             <a:endParaRPr lang="en-US" dirty="0"/>
           </a:p>
@@ -4116,7 +4116,7 @@
             <a:fld id="{B61BEF0D-F0BB-DE4B-95CE-6DB70DBA9567}" type="datetimeFigureOut">
               <a:rPr lang="en-US" smtClean="0"/>
               <a:pPr/>
-              <a:t>4/24/2024</a:t>
+              <a:t>6/2/2024</a:t>
             </a:fld>
             <a:endParaRPr lang="en-US" dirty="0"/>
           </a:p>
@@ -4372,7 +4372,7 @@
           <a:p>
             <a:fld id="{42A54C80-263E-416B-A8E0-580EDEADCBDC}" type="datetimeFigureOut">
               <a:rPr lang="en-US" smtClean="0"/>
-              <a:t>4/24/2024</a:t>
+              <a:t>6/2/2024</a:t>
             </a:fld>
             <a:endParaRPr lang="en-US" dirty="0"/>
           </a:p>
@@ -4636,7 +4636,7 @@
             <a:fld id="{B61BEF0D-F0BB-DE4B-95CE-6DB70DBA9567}" type="datetimeFigureOut">
               <a:rPr lang="en-US" smtClean="0"/>
               <a:pPr/>
-              <a:t>4/24/2024</a:t>
+              <a:t>6/2/2024</a:t>
             </a:fld>
             <a:endParaRPr lang="en-US" dirty="0"/>
           </a:p>
@@ -5381,7 +5381,7 @@
             <a:fld id="{B61BEF0D-F0BB-DE4B-95CE-6DB70DBA9567}" type="datetimeFigureOut">
               <a:rPr lang="en-US" smtClean="0"/>
               <a:pPr/>
-              <a:t>4/24/2024</a:t>
+              <a:t>6/2/2024</a:t>
             </a:fld>
             <a:endParaRPr lang="en-US" dirty="0"/>
           </a:p>
@@ -31357,7 +31357,15 @@
             </a:pPr>
             <a:r>
               <a:rPr lang="en-US" dirty="0"/>
-              <a:t>Bonsai: a small tree that appears to be a scaled-down large tree.</a:t>
+              <a:t>A bonsai is a </a:t>
+            </a:r>
+            <a:r>
+              <a:rPr lang="en-US" b="1" dirty="0"/>
+              <a:t>living trompe-l’oeil</a:t>
+            </a:r>
+            <a:r>
+              <a:rPr lang="en-US" dirty="0"/>
+              <a:t>: a small tree that appears to be a scaled-down large tree.</a:t>
             </a:r>
           </a:p>
           <a:p>

</xml_diff>

<commit_message>
Added images for Authenticity, Drama, Styles
</commit_message>
<xml_diff>
--- a/WGCourse/Bonsai On A Budget (running).pptx
+++ b/WGCourse/Bonsai On A Budget (running).pptx
@@ -6010,56 +6010,6 @@
       </p:grpSpPr>
       <p:sp>
         <p:nvSpPr>
-          <p:cNvPr id="9" name="Rectangle 8">
-            <a:extLst>
-              <a:ext uri="{FF2B5EF4-FFF2-40B4-BE49-F238E27FC236}">
-                <a16:creationId xmlns:a16="http://schemas.microsoft.com/office/drawing/2014/main" id="{1EF8C3C4-B368-32C3-4276-F6DD6F585E41}"/>
-              </a:ext>
-            </a:extLst>
-          </p:cNvPr>
-          <p:cNvSpPr/>
-          <p:nvPr/>
-        </p:nvSpPr>
-        <p:spPr>
-          <a:xfrm>
-            <a:off x="677333" y="1896034"/>
-            <a:ext cx="4620807" cy="2245660"/>
-          </a:xfrm>
-          <a:prstGeom prst="rect">
-            <a:avLst/>
-          </a:prstGeom>
-        </p:spPr>
-        <p:style>
-          <a:lnRef idx="2">
-            <a:schemeClr val="accent1">
-              <a:shade val="15000"/>
-            </a:schemeClr>
-          </a:lnRef>
-          <a:fillRef idx="1">
-            <a:schemeClr val="accent1"/>
-          </a:fillRef>
-          <a:effectRef idx="0">
-            <a:schemeClr val="accent1"/>
-          </a:effectRef>
-          <a:fontRef idx="minor">
-            <a:schemeClr val="lt1"/>
-          </a:fontRef>
-        </p:style>
-        <p:txBody>
-          <a:bodyPr rtlCol="0" anchor="ctr"/>
-          <a:lstStyle/>
-          <a:p>
-            <a:pPr algn="ctr"/>
-            <a:r>
-              <a:rPr lang="en-US" dirty="0"/>
-              <a:t>Image</a:t>
-            </a:r>
-            <a:endParaRPr lang="en-GB" dirty="0"/>
-          </a:p>
-        </p:txBody>
-      </p:sp>
-      <p:sp>
-        <p:nvSpPr>
           <p:cNvPr id="4" name="Parallelogram 3">
             <a:extLst>
               <a:ext uri="{FF2B5EF4-FFF2-40B4-BE49-F238E27FC236}">
@@ -6201,7 +6151,7 @@
             <a:pPr lvl="1"/>
             <a:r>
               <a:rPr lang="en-US" dirty="0"/>
-              <a:t>Composed of rounded-triangle “pads” (for species that don’t back-bud readily)</a:t>
+              <a:t>Composed of rounded-triangle “pads” (for species that back-bud less readily)</a:t>
             </a:r>
           </a:p>
           <a:p>
@@ -6233,7 +6183,7 @@
             <a:pPr lvl="1"/>
             <a:r>
               <a:rPr lang="en-US" dirty="0"/>
-              <a:t>“Square-cube law”: big tree = heavier load = more curvature</a:t>
+              <a:t>“Square-cube law”: big tree = proportionally heavier load = more curvature</a:t>
             </a:r>
           </a:p>
           <a:p>
@@ -6564,12 +6514,48 @@
           </a:p>
         </p:txBody>
       </p:sp>
+      <p:pic>
+        <p:nvPicPr>
+          <p:cNvPr id="10" name="Picture 9">
+            <a:extLst>
+              <a:ext uri="{FF2B5EF4-FFF2-40B4-BE49-F238E27FC236}">
+                <a16:creationId xmlns:a16="http://schemas.microsoft.com/office/drawing/2014/main" id="{5C280E11-2DA9-F19A-F603-F0E36737500E}"/>
+              </a:ext>
+            </a:extLst>
+          </p:cNvPr>
+          <p:cNvPicPr>
+            <a:picLocks noChangeAspect="1"/>
+          </p:cNvPicPr>
+          <p:nvPr/>
+        </p:nvPicPr>
+        <p:blipFill>
+          <a:blip r:embed="rId2" cstate="screen">
+            <a:extLst>
+              <a:ext uri="{28A0092B-C50C-407E-A947-70E740481C1C}">
+                <a14:useLocalDpi xmlns:a14="http://schemas.microsoft.com/office/drawing/2010/main"/>
+              </a:ext>
+            </a:extLst>
+          </a:blip>
+          <a:stretch>
+            <a:fillRect/>
+          </a:stretch>
+        </p:blipFill>
+        <p:spPr>
+          <a:xfrm>
+            <a:off x="1158577" y="1842246"/>
+            <a:ext cx="3736152" cy="2802114"/>
+          </a:xfrm>
+          <a:prstGeom prst="rect">
+            <a:avLst/>
+          </a:prstGeom>
+        </p:spPr>
+      </p:pic>
       <p:sp>
         <p:nvSpPr>
-          <p:cNvPr id="8" name="Rectangle 7">
+          <p:cNvPr id="11" name="Rectangle 10">
             <a:extLst>
               <a:ext uri="{FF2B5EF4-FFF2-40B4-BE49-F238E27FC236}">
-                <a16:creationId xmlns:a16="http://schemas.microsoft.com/office/drawing/2014/main" id="{D2FB11B6-BCF7-EFEF-3EE8-30BA6406D85A}"/>
+                <a16:creationId xmlns:a16="http://schemas.microsoft.com/office/drawing/2014/main" id="{FD16D504-F53D-5EDF-B94C-F0109325ECB1}"/>
               </a:ext>
             </a:extLst>
           </p:cNvPr>
@@ -6587,15 +6573,15 @@
         </p:spPr>
         <p:style>
           <a:lnRef idx="2">
-            <a:schemeClr val="accent3">
+            <a:schemeClr val="accent1">
               <a:shade val="15000"/>
             </a:schemeClr>
           </a:lnRef>
           <a:fillRef idx="1">
-            <a:schemeClr val="accent3"/>
+            <a:schemeClr val="accent1"/>
           </a:fillRef>
           <a:effectRef idx="0">
-            <a:schemeClr val="accent3"/>
+            <a:schemeClr val="accent1"/>
           </a:effectRef>
           <a:fontRef idx="minor">
             <a:schemeClr val="lt1"/>
@@ -6608,7 +6594,7 @@
             <a:pPr algn="ctr"/>
             <a:r>
               <a:rPr lang="en-US" dirty="0"/>
-              <a:t>Add picture</a:t>
+              <a:t>Good enough</a:t>
             </a:r>
             <a:endParaRPr lang="en-GB" dirty="0"/>
           </a:p>
@@ -7151,12 +7137,48 @@
           </a:p>
         </p:txBody>
       </p:sp>
+      <p:pic>
+        <p:nvPicPr>
+          <p:cNvPr id="11" name="Picture 10">
+            <a:extLst>
+              <a:ext uri="{FF2B5EF4-FFF2-40B4-BE49-F238E27FC236}">
+                <a16:creationId xmlns:a16="http://schemas.microsoft.com/office/drawing/2014/main" id="{09E8B13A-76DF-3BAB-9EBF-FECB3ED08D6D}"/>
+              </a:ext>
+            </a:extLst>
+          </p:cNvPr>
+          <p:cNvPicPr>
+            <a:picLocks noChangeAspect="1"/>
+          </p:cNvPicPr>
+          <p:nvPr/>
+        </p:nvPicPr>
+        <p:blipFill>
+          <a:blip r:embed="rId2" cstate="screen">
+            <a:extLst>
+              <a:ext uri="{28A0092B-C50C-407E-A947-70E740481C1C}">
+                <a14:useLocalDpi xmlns:a14="http://schemas.microsoft.com/office/drawing/2010/main"/>
+              </a:ext>
+            </a:extLst>
+          </a:blip>
+          <a:stretch>
+            <a:fillRect/>
+          </a:stretch>
+        </p:blipFill>
+        <p:spPr>
+          <a:xfrm>
+            <a:off x="1265526" y="1761564"/>
+            <a:ext cx="3303244" cy="2477433"/>
+          </a:xfrm>
+          <a:prstGeom prst="rect">
+            <a:avLst/>
+          </a:prstGeom>
+        </p:spPr>
+      </p:pic>
       <p:sp>
         <p:nvSpPr>
-          <p:cNvPr id="8" name="Rectangle 7">
+          <p:cNvPr id="12" name="Rectangle 11">
             <a:extLst>
               <a:ext uri="{FF2B5EF4-FFF2-40B4-BE49-F238E27FC236}">
-                <a16:creationId xmlns:a16="http://schemas.microsoft.com/office/drawing/2014/main" id="{08E1DFB0-92B4-3772-E974-4B1F6DFC0224}"/>
+                <a16:creationId xmlns:a16="http://schemas.microsoft.com/office/drawing/2014/main" id="{19C4FB44-464B-34E0-6225-20A11A474753}"/>
               </a:ext>
             </a:extLst>
           </p:cNvPr>
@@ -7165,8 +7187,8 @@
         </p:nvSpPr>
         <p:spPr>
           <a:xfrm>
-            <a:off x="677333" y="1896034"/>
-            <a:ext cx="4620807" cy="2245660"/>
+            <a:off x="7070912" y="372088"/>
+            <a:ext cx="3966882" cy="582653"/>
           </a:xfrm>
           <a:prstGeom prst="rect">
             <a:avLst/>
@@ -7195,57 +7217,7 @@
             <a:pPr algn="ctr"/>
             <a:r>
               <a:rPr lang="en-US" dirty="0"/>
-              <a:t>Image</a:t>
-            </a:r>
-            <a:endParaRPr lang="en-GB" dirty="0"/>
-          </a:p>
-        </p:txBody>
-      </p:sp>
-      <p:sp>
-        <p:nvSpPr>
-          <p:cNvPr id="5" name="Rectangle 4">
-            <a:extLst>
-              <a:ext uri="{FF2B5EF4-FFF2-40B4-BE49-F238E27FC236}">
-                <a16:creationId xmlns:a16="http://schemas.microsoft.com/office/drawing/2014/main" id="{5BD9335A-E468-C8E1-9EB3-099C92F438ED}"/>
-              </a:ext>
-            </a:extLst>
-          </p:cNvPr>
-          <p:cNvSpPr/>
-          <p:nvPr/>
-        </p:nvSpPr>
-        <p:spPr>
-          <a:xfrm>
-            <a:off x="7070912" y="372088"/>
-            <a:ext cx="3966882" cy="582653"/>
-          </a:xfrm>
-          <a:prstGeom prst="rect">
-            <a:avLst/>
-          </a:prstGeom>
-        </p:spPr>
-        <p:style>
-          <a:lnRef idx="2">
-            <a:schemeClr val="accent3">
-              <a:shade val="15000"/>
-            </a:schemeClr>
-          </a:lnRef>
-          <a:fillRef idx="1">
-            <a:schemeClr val="accent3"/>
-          </a:fillRef>
-          <a:effectRef idx="0">
-            <a:schemeClr val="accent3"/>
-          </a:effectRef>
-          <a:fontRef idx="minor">
-            <a:schemeClr val="lt1"/>
-          </a:fontRef>
-        </p:style>
-        <p:txBody>
-          <a:bodyPr rtlCol="0" anchor="ctr"/>
-          <a:lstStyle/>
-          <a:p>
-            <a:pPr algn="ctr"/>
-            <a:r>
-              <a:rPr lang="en-US" dirty="0"/>
-              <a:t>Add picture</a:t>
+              <a:t>Good enough</a:t>
             </a:r>
             <a:endParaRPr lang="en-GB" dirty="0"/>
           </a:p>
@@ -7463,13 +7435,16 @@
             <a:pPr lvl="1"/>
             <a:r>
               <a:rPr lang="en-US" dirty="0"/>
-              <a:t>Frequently ignored: small shrubs portrayed as large trees, boringly-shaped species, pads on back-budding species </a:t>
+              <a:t>This rule is !</a:t>
             </a:r>
             <a:r>
               <a:rPr lang="en-US" dirty="0" err="1"/>
-              <a:t>etc</a:t>
-            </a:r>
-            <a:endParaRPr lang="en-US" dirty="0"/>
+              <a:t>requently</a:t>
+            </a:r>
+            <a:r>
+              <a:rPr lang="en-US" dirty="0"/>
+              <a:t> ignored: e.g. small shrubs portrayed as large trees, boringly-shaped species made interesting, unrealistic pads</a:t>
+            </a:r>
           </a:p>
           <a:p>
             <a:r>
@@ -7902,6 +7877,157 @@
           <a:chExt cx="0" cy="0"/>
         </a:xfrm>
       </p:grpSpPr>
+      <p:sp>
+        <p:nvSpPr>
+          <p:cNvPr id="25" name="Isosceles Triangle 24">
+            <a:extLst>
+              <a:ext uri="{FF2B5EF4-FFF2-40B4-BE49-F238E27FC236}">
+                <a16:creationId xmlns:a16="http://schemas.microsoft.com/office/drawing/2014/main" id="{64841AEB-06AF-20C1-66BB-4098825498BB}"/>
+              </a:ext>
+            </a:extLst>
+          </p:cNvPr>
+          <p:cNvSpPr/>
+          <p:nvPr/>
+        </p:nvSpPr>
+        <p:spPr>
+          <a:xfrm>
+            <a:off x="1426179" y="5093118"/>
+            <a:ext cx="933769" cy="293710"/>
+          </a:xfrm>
+          <a:prstGeom prst="triangle">
+            <a:avLst>
+              <a:gd name="adj" fmla="val 69756"/>
+            </a:avLst>
+          </a:prstGeom>
+          <a:ln>
+            <a:noFill/>
+          </a:ln>
+        </p:spPr>
+        <p:style>
+          <a:lnRef idx="2">
+            <a:schemeClr val="accent1">
+              <a:shade val="15000"/>
+            </a:schemeClr>
+          </a:lnRef>
+          <a:fillRef idx="1">
+            <a:schemeClr val="accent1"/>
+          </a:fillRef>
+          <a:effectRef idx="0">
+            <a:schemeClr val="accent1"/>
+          </a:effectRef>
+          <a:fontRef idx="minor">
+            <a:schemeClr val="lt1"/>
+          </a:fontRef>
+        </p:style>
+        <p:txBody>
+          <a:bodyPr rtlCol="0" anchor="ctr"/>
+          <a:lstStyle/>
+          <a:p>
+            <a:pPr algn="ctr"/>
+            <a:endParaRPr lang="en-GB"/>
+          </a:p>
+        </p:txBody>
+      </p:sp>
+      <p:sp>
+        <p:nvSpPr>
+          <p:cNvPr id="24" name="Isosceles Triangle 23">
+            <a:extLst>
+              <a:ext uri="{FF2B5EF4-FFF2-40B4-BE49-F238E27FC236}">
+                <a16:creationId xmlns:a16="http://schemas.microsoft.com/office/drawing/2014/main" id="{F677A24D-A5C0-159B-9A24-F2173B61C58D}"/>
+              </a:ext>
+            </a:extLst>
+          </p:cNvPr>
+          <p:cNvSpPr/>
+          <p:nvPr/>
+        </p:nvSpPr>
+        <p:spPr>
+          <a:xfrm>
+            <a:off x="660748" y="5098220"/>
+            <a:ext cx="1552469" cy="474358"/>
+          </a:xfrm>
+          <a:prstGeom prst="triangle">
+            <a:avLst>
+              <a:gd name="adj" fmla="val 31671"/>
+            </a:avLst>
+          </a:prstGeom>
+          <a:ln>
+            <a:noFill/>
+          </a:ln>
+        </p:spPr>
+        <p:style>
+          <a:lnRef idx="2">
+            <a:schemeClr val="accent1">
+              <a:shade val="15000"/>
+            </a:schemeClr>
+          </a:lnRef>
+          <a:fillRef idx="1">
+            <a:schemeClr val="accent1"/>
+          </a:fillRef>
+          <a:effectRef idx="0">
+            <a:schemeClr val="accent1"/>
+          </a:effectRef>
+          <a:fontRef idx="minor">
+            <a:schemeClr val="lt1"/>
+          </a:fontRef>
+        </p:style>
+        <p:txBody>
+          <a:bodyPr rtlCol="0" anchor="ctr"/>
+          <a:lstStyle/>
+          <a:p>
+            <a:pPr algn="ctr"/>
+            <a:endParaRPr lang="en-GB"/>
+          </a:p>
+        </p:txBody>
+      </p:sp>
+      <p:sp>
+        <p:nvSpPr>
+          <p:cNvPr id="19" name="Isosceles Triangle 18">
+            <a:extLst>
+              <a:ext uri="{FF2B5EF4-FFF2-40B4-BE49-F238E27FC236}">
+                <a16:creationId xmlns:a16="http://schemas.microsoft.com/office/drawing/2014/main" id="{3E08DD37-E2CD-7281-2F42-FFAF252F1DBA}"/>
+              </a:ext>
+            </a:extLst>
+          </p:cNvPr>
+          <p:cNvSpPr/>
+          <p:nvPr/>
+        </p:nvSpPr>
+        <p:spPr>
+          <a:xfrm>
+            <a:off x="651891" y="2305878"/>
+            <a:ext cx="1822368" cy="1085483"/>
+          </a:xfrm>
+          <a:prstGeom prst="triangle">
+            <a:avLst/>
+          </a:prstGeom>
+          <a:ln>
+            <a:noFill/>
+          </a:ln>
+        </p:spPr>
+        <p:style>
+          <a:lnRef idx="2">
+            <a:schemeClr val="accent1">
+              <a:shade val="15000"/>
+            </a:schemeClr>
+          </a:lnRef>
+          <a:fillRef idx="1">
+            <a:schemeClr val="accent1"/>
+          </a:fillRef>
+          <a:effectRef idx="0">
+            <a:schemeClr val="accent1"/>
+          </a:effectRef>
+          <a:fontRef idx="minor">
+            <a:schemeClr val="lt1"/>
+          </a:fontRef>
+        </p:style>
+        <p:txBody>
+          <a:bodyPr rtlCol="0" anchor="ctr"/>
+          <a:lstStyle/>
+          <a:p>
+            <a:pPr algn="ctr"/>
+            <a:endParaRPr lang="en-GB"/>
+          </a:p>
+        </p:txBody>
+      </p:sp>
       <p:sp>
         <p:nvSpPr>
           <p:cNvPr id="4" name="Parallelogram 3">
@@ -8311,56 +8437,6 @@
       </p:sp>
       <p:sp>
         <p:nvSpPr>
-          <p:cNvPr id="7" name="Rectangle 6">
-            <a:extLst>
-              <a:ext uri="{FF2B5EF4-FFF2-40B4-BE49-F238E27FC236}">
-                <a16:creationId xmlns:a16="http://schemas.microsoft.com/office/drawing/2014/main" id="{7BC14771-3CF3-3854-8498-EDC7CD0E0244}"/>
-              </a:ext>
-            </a:extLst>
-          </p:cNvPr>
-          <p:cNvSpPr/>
-          <p:nvPr/>
-        </p:nvSpPr>
-        <p:spPr>
-          <a:xfrm>
-            <a:off x="677334" y="2274325"/>
-            <a:ext cx="1949824" cy="1566937"/>
-          </a:xfrm>
-          <a:prstGeom prst="rect">
-            <a:avLst/>
-          </a:prstGeom>
-        </p:spPr>
-        <p:style>
-          <a:lnRef idx="2">
-            <a:schemeClr val="accent1">
-              <a:shade val="15000"/>
-            </a:schemeClr>
-          </a:lnRef>
-          <a:fillRef idx="1">
-            <a:schemeClr val="accent1"/>
-          </a:fillRef>
-          <a:effectRef idx="0">
-            <a:schemeClr val="accent1"/>
-          </a:effectRef>
-          <a:fontRef idx="minor">
-            <a:schemeClr val="lt1"/>
-          </a:fontRef>
-        </p:style>
-        <p:txBody>
-          <a:bodyPr rtlCol="0" anchor="ctr"/>
-          <a:lstStyle/>
-          <a:p>
-            <a:pPr algn="ctr"/>
-            <a:r>
-              <a:rPr lang="en-US" dirty="0"/>
-              <a:t>Image</a:t>
-            </a:r>
-            <a:endParaRPr lang="en-GB" dirty="0"/>
-          </a:p>
-        </p:txBody>
-      </p:sp>
-      <p:sp>
-        <p:nvSpPr>
           <p:cNvPr id="8" name="Content Placeholder 2">
             <a:extLst>
               <a:ext uri="{FF2B5EF4-FFF2-40B4-BE49-F238E27FC236}">
@@ -8908,56 +8984,6 @@
       </p:sp>
       <p:sp>
         <p:nvSpPr>
-          <p:cNvPr id="11" name="Rectangle 10">
-            <a:extLst>
-              <a:ext uri="{FF2B5EF4-FFF2-40B4-BE49-F238E27FC236}">
-                <a16:creationId xmlns:a16="http://schemas.microsoft.com/office/drawing/2014/main" id="{079B88C3-31AF-28AD-63F9-7FE8251089B9}"/>
-              </a:ext>
-            </a:extLst>
-          </p:cNvPr>
-          <p:cNvSpPr/>
-          <p:nvPr/>
-        </p:nvSpPr>
-        <p:spPr>
-          <a:xfrm>
-            <a:off x="6102670" y="2274325"/>
-            <a:ext cx="1949824" cy="1566937"/>
-          </a:xfrm>
-          <a:prstGeom prst="rect">
-            <a:avLst/>
-          </a:prstGeom>
-        </p:spPr>
-        <p:style>
-          <a:lnRef idx="2">
-            <a:schemeClr val="accent1">
-              <a:shade val="15000"/>
-            </a:schemeClr>
-          </a:lnRef>
-          <a:fillRef idx="1">
-            <a:schemeClr val="accent1"/>
-          </a:fillRef>
-          <a:effectRef idx="0">
-            <a:schemeClr val="accent1"/>
-          </a:effectRef>
-          <a:fontRef idx="minor">
-            <a:schemeClr val="lt1"/>
-          </a:fontRef>
-        </p:style>
-        <p:txBody>
-          <a:bodyPr rtlCol="0" anchor="ctr"/>
-          <a:lstStyle/>
-          <a:p>
-            <a:pPr algn="ctr"/>
-            <a:r>
-              <a:rPr lang="en-US" dirty="0"/>
-              <a:t>Image</a:t>
-            </a:r>
-            <a:endParaRPr lang="en-GB" dirty="0"/>
-          </a:p>
-        </p:txBody>
-      </p:sp>
-      <p:sp>
-        <p:nvSpPr>
           <p:cNvPr id="12" name="Content Placeholder 2">
             <a:extLst>
               <a:ext uri="{FF2B5EF4-FFF2-40B4-BE49-F238E27FC236}">
@@ -9506,56 +9532,6 @@
       </p:sp>
       <p:sp>
         <p:nvSpPr>
-          <p:cNvPr id="14" name="Rectangle 13">
-            <a:extLst>
-              <a:ext uri="{FF2B5EF4-FFF2-40B4-BE49-F238E27FC236}">
-                <a16:creationId xmlns:a16="http://schemas.microsoft.com/office/drawing/2014/main" id="{E0CBE339-53ED-A2D7-4568-AD8BF5AC4A77}"/>
-              </a:ext>
-            </a:extLst>
-          </p:cNvPr>
-          <p:cNvSpPr/>
-          <p:nvPr/>
-        </p:nvSpPr>
-        <p:spPr>
-          <a:xfrm>
-            <a:off x="677334" y="4725232"/>
-            <a:ext cx="1949824" cy="1566937"/>
-          </a:xfrm>
-          <a:prstGeom prst="rect">
-            <a:avLst/>
-          </a:prstGeom>
-        </p:spPr>
-        <p:style>
-          <a:lnRef idx="2">
-            <a:schemeClr val="accent1">
-              <a:shade val="15000"/>
-            </a:schemeClr>
-          </a:lnRef>
-          <a:fillRef idx="1">
-            <a:schemeClr val="accent1"/>
-          </a:fillRef>
-          <a:effectRef idx="0">
-            <a:schemeClr val="accent1"/>
-          </a:effectRef>
-          <a:fontRef idx="minor">
-            <a:schemeClr val="lt1"/>
-          </a:fontRef>
-        </p:style>
-        <p:txBody>
-          <a:bodyPr rtlCol="0" anchor="ctr"/>
-          <a:lstStyle/>
-          <a:p>
-            <a:pPr algn="ctr"/>
-            <a:r>
-              <a:rPr lang="en-US" dirty="0"/>
-              <a:t>Image</a:t>
-            </a:r>
-            <a:endParaRPr lang="en-GB" dirty="0"/>
-          </a:p>
-        </p:txBody>
-      </p:sp>
-      <p:sp>
-        <p:nvSpPr>
           <p:cNvPr id="15" name="Content Placeholder 2">
             <a:extLst>
               <a:ext uri="{FF2B5EF4-FFF2-40B4-BE49-F238E27FC236}">
@@ -10112,10 +10088,10 @@
       </p:sp>
       <p:sp>
         <p:nvSpPr>
-          <p:cNvPr id="17" name="Rectangle 16">
+          <p:cNvPr id="6" name="Trapezoid 5">
             <a:extLst>
               <a:ext uri="{FF2B5EF4-FFF2-40B4-BE49-F238E27FC236}">
-                <a16:creationId xmlns:a16="http://schemas.microsoft.com/office/drawing/2014/main" id="{A583A223-216E-3DAB-01FA-7364838DEF83}"/>
+                <a16:creationId xmlns:a16="http://schemas.microsoft.com/office/drawing/2014/main" id="{5E2CE244-7E50-FFC0-A1CB-EEC86F0EB208}"/>
               </a:ext>
             </a:extLst>
           </p:cNvPr>
@@ -10124,8 +10100,1015 @@
         </p:nvSpPr>
         <p:spPr>
           <a:xfrm>
-            <a:off x="6096000" y="4725232"/>
-            <a:ext cx="1949824" cy="1566937"/>
+            <a:off x="1147882" y="2853764"/>
+            <a:ext cx="858374" cy="882798"/>
+          </a:xfrm>
+          <a:prstGeom prst="trapezoid">
+            <a:avLst/>
+          </a:prstGeom>
+          <a:solidFill>
+            <a:srgbClr val="996633"/>
+          </a:solidFill>
+          <a:ln>
+            <a:noFill/>
+          </a:ln>
+        </p:spPr>
+        <p:style>
+          <a:lnRef idx="2">
+            <a:schemeClr val="accent1">
+              <a:shade val="15000"/>
+            </a:schemeClr>
+          </a:lnRef>
+          <a:fillRef idx="1">
+            <a:schemeClr val="accent1"/>
+          </a:fillRef>
+          <a:effectRef idx="0">
+            <a:schemeClr val="accent1"/>
+          </a:effectRef>
+          <a:fontRef idx="minor">
+            <a:schemeClr val="lt1"/>
+          </a:fontRef>
+        </p:style>
+        <p:txBody>
+          <a:bodyPr rtlCol="0" anchor="ctr"/>
+          <a:lstStyle/>
+          <a:p>
+            <a:pPr algn="ctr"/>
+            <a:endParaRPr lang="en-GB"/>
+          </a:p>
+        </p:txBody>
+      </p:sp>
+      <p:sp>
+        <p:nvSpPr>
+          <p:cNvPr id="9" name="Isosceles Triangle 8">
+            <a:extLst>
+              <a:ext uri="{FF2B5EF4-FFF2-40B4-BE49-F238E27FC236}">
+                <a16:creationId xmlns:a16="http://schemas.microsoft.com/office/drawing/2014/main" id="{A1088223-DBA3-D266-8F29-9A20353CB975}"/>
+              </a:ext>
+            </a:extLst>
+          </p:cNvPr>
+          <p:cNvSpPr/>
+          <p:nvPr/>
+        </p:nvSpPr>
+        <p:spPr>
+          <a:xfrm>
+            <a:off x="928845" y="2305878"/>
+            <a:ext cx="1268460" cy="751915"/>
+          </a:xfrm>
+          <a:prstGeom prst="triangle">
+            <a:avLst/>
+          </a:prstGeom>
+          <a:ln>
+            <a:noFill/>
+          </a:ln>
+        </p:spPr>
+        <p:style>
+          <a:lnRef idx="2">
+            <a:schemeClr val="accent1">
+              <a:shade val="15000"/>
+            </a:schemeClr>
+          </a:lnRef>
+          <a:fillRef idx="1">
+            <a:schemeClr val="accent1"/>
+          </a:fillRef>
+          <a:effectRef idx="0">
+            <a:schemeClr val="accent1"/>
+          </a:effectRef>
+          <a:fontRef idx="minor">
+            <a:schemeClr val="lt1"/>
+          </a:fontRef>
+        </p:style>
+        <p:txBody>
+          <a:bodyPr rtlCol="0" anchor="ctr"/>
+          <a:lstStyle/>
+          <a:p>
+            <a:pPr algn="ctr"/>
+            <a:endParaRPr lang="en-GB"/>
+          </a:p>
+        </p:txBody>
+      </p:sp>
+      <p:sp>
+        <p:nvSpPr>
+          <p:cNvPr id="18" name="Trapezoid 17">
+            <a:extLst>
+              <a:ext uri="{FF2B5EF4-FFF2-40B4-BE49-F238E27FC236}">
+                <a16:creationId xmlns:a16="http://schemas.microsoft.com/office/drawing/2014/main" id="{DACC2588-F4F0-9B75-1A34-1DE78D037377}"/>
+              </a:ext>
+            </a:extLst>
+          </p:cNvPr>
+          <p:cNvSpPr/>
+          <p:nvPr/>
+        </p:nvSpPr>
+        <p:spPr>
+          <a:xfrm flipV="1">
+            <a:off x="833718" y="3627392"/>
+            <a:ext cx="1458714" cy="397044"/>
+          </a:xfrm>
+          <a:prstGeom prst="trapezoid">
+            <a:avLst>
+              <a:gd name="adj" fmla="val 18226"/>
+            </a:avLst>
+          </a:prstGeom>
+          <a:solidFill>
+            <a:schemeClr val="accent6">
+              <a:lumMod val="50000"/>
+            </a:schemeClr>
+          </a:solidFill>
+          <a:ln>
+            <a:noFill/>
+          </a:ln>
+        </p:spPr>
+        <p:style>
+          <a:lnRef idx="2">
+            <a:schemeClr val="accent1">
+              <a:shade val="15000"/>
+            </a:schemeClr>
+          </a:lnRef>
+          <a:fillRef idx="1">
+            <a:schemeClr val="accent1"/>
+          </a:fillRef>
+          <a:effectRef idx="0">
+            <a:schemeClr val="accent1"/>
+          </a:effectRef>
+          <a:fontRef idx="minor">
+            <a:schemeClr val="lt1"/>
+          </a:fontRef>
+        </p:style>
+        <p:txBody>
+          <a:bodyPr rtlCol="0" anchor="ctr"/>
+          <a:lstStyle/>
+          <a:p>
+            <a:pPr algn="ctr"/>
+            <a:endParaRPr lang="en-GB"/>
+          </a:p>
+        </p:txBody>
+      </p:sp>
+      <p:sp>
+        <p:nvSpPr>
+          <p:cNvPr id="22" name="Freeform: Shape 21">
+            <a:extLst>
+              <a:ext uri="{FF2B5EF4-FFF2-40B4-BE49-F238E27FC236}">
+                <a16:creationId xmlns:a16="http://schemas.microsoft.com/office/drawing/2014/main" id="{A6947CB1-9DA4-4939-05F5-D160E8DEB58E}"/>
+              </a:ext>
+            </a:extLst>
+          </p:cNvPr>
+          <p:cNvSpPr/>
+          <p:nvPr/>
+        </p:nvSpPr>
+        <p:spPr>
+          <a:xfrm>
+            <a:off x="1354861" y="4816334"/>
+            <a:ext cx="444415" cy="1236424"/>
+          </a:xfrm>
+          <a:custGeom>
+            <a:avLst/>
+            <a:gdLst>
+              <a:gd name="connsiteX0" fmla="*/ 255494 w 444415"/>
+              <a:gd name="connsiteY0" fmla="*/ 1236424 h 1236424"/>
+              <a:gd name="connsiteX1" fmla="*/ 107576 w 444415"/>
+              <a:gd name="connsiteY1" fmla="*/ 873354 h 1236424"/>
+              <a:gd name="connsiteX2" fmla="*/ 443753 w 444415"/>
+              <a:gd name="connsiteY2" fmla="*/ 537177 h 1236424"/>
+              <a:gd name="connsiteX3" fmla="*/ 188259 w 444415"/>
+              <a:gd name="connsiteY3" fmla="*/ 12742 h 1236424"/>
+              <a:gd name="connsiteX4" fmla="*/ 0 w 444415"/>
+              <a:gd name="connsiteY4" fmla="*/ 160660 h 1236424"/>
+            </a:gdLst>
+            <a:ahLst/>
+            <a:cxnLst>
+              <a:cxn ang="0">
+                <a:pos x="connsiteX0" y="connsiteY0"/>
+              </a:cxn>
+              <a:cxn ang="0">
+                <a:pos x="connsiteX1" y="connsiteY1"/>
+              </a:cxn>
+              <a:cxn ang="0">
+                <a:pos x="connsiteX2" y="connsiteY2"/>
+              </a:cxn>
+              <a:cxn ang="0">
+                <a:pos x="connsiteX3" y="connsiteY3"/>
+              </a:cxn>
+              <a:cxn ang="0">
+                <a:pos x="connsiteX4" y="connsiteY4"/>
+              </a:cxn>
+            </a:cxnLst>
+            <a:rect l="l" t="t" r="r" b="b"/>
+            <a:pathLst>
+              <a:path w="444415" h="1236424">
+                <a:moveTo>
+                  <a:pt x="255494" y="1236424"/>
+                </a:moveTo>
+                <a:cubicBezTo>
+                  <a:pt x="165846" y="1113159"/>
+                  <a:pt x="76199" y="989895"/>
+                  <a:pt x="107576" y="873354"/>
+                </a:cubicBezTo>
+                <a:cubicBezTo>
+                  <a:pt x="138952" y="756813"/>
+                  <a:pt x="430306" y="680612"/>
+                  <a:pt x="443753" y="537177"/>
+                </a:cubicBezTo>
+                <a:cubicBezTo>
+                  <a:pt x="457200" y="393742"/>
+                  <a:pt x="262218" y="75495"/>
+                  <a:pt x="188259" y="12742"/>
+                </a:cubicBezTo>
+                <a:cubicBezTo>
+                  <a:pt x="114300" y="-50011"/>
+                  <a:pt x="26894" y="138248"/>
+                  <a:pt x="0" y="160660"/>
+                </a:cubicBezTo>
+              </a:path>
+            </a:pathLst>
+          </a:custGeom>
+          <a:noFill/>
+          <a:ln w="228600">
+            <a:solidFill>
+              <a:srgbClr val="996633"/>
+            </a:solidFill>
+          </a:ln>
+        </p:spPr>
+        <p:style>
+          <a:lnRef idx="2">
+            <a:schemeClr val="accent1">
+              <a:shade val="15000"/>
+            </a:schemeClr>
+          </a:lnRef>
+          <a:fillRef idx="1">
+            <a:schemeClr val="accent1"/>
+          </a:fillRef>
+          <a:effectRef idx="0">
+            <a:schemeClr val="accent1"/>
+          </a:effectRef>
+          <a:fontRef idx="minor">
+            <a:schemeClr val="lt1"/>
+          </a:fontRef>
+        </p:style>
+        <p:txBody>
+          <a:bodyPr rtlCol="0" anchor="ctr"/>
+          <a:lstStyle/>
+          <a:p>
+            <a:pPr algn="ctr"/>
+            <a:endParaRPr lang="en-GB"/>
+          </a:p>
+        </p:txBody>
+      </p:sp>
+      <p:sp>
+        <p:nvSpPr>
+          <p:cNvPr id="21" name="Trapezoid 20">
+            <a:extLst>
+              <a:ext uri="{FF2B5EF4-FFF2-40B4-BE49-F238E27FC236}">
+                <a16:creationId xmlns:a16="http://schemas.microsoft.com/office/drawing/2014/main" id="{44154427-6386-C906-BC32-CB49DA45C293}"/>
+              </a:ext>
+            </a:extLst>
+          </p:cNvPr>
+          <p:cNvSpPr/>
+          <p:nvPr/>
+        </p:nvSpPr>
+        <p:spPr>
+          <a:xfrm flipV="1">
+            <a:off x="829916" y="5889811"/>
+            <a:ext cx="1458714" cy="293709"/>
+          </a:xfrm>
+          <a:prstGeom prst="trapezoid">
+            <a:avLst>
+              <a:gd name="adj" fmla="val 48708"/>
+            </a:avLst>
+          </a:prstGeom>
+          <a:solidFill>
+            <a:schemeClr val="accent6">
+              <a:lumMod val="50000"/>
+            </a:schemeClr>
+          </a:solidFill>
+          <a:ln>
+            <a:noFill/>
+          </a:ln>
+        </p:spPr>
+        <p:style>
+          <a:lnRef idx="2">
+            <a:schemeClr val="accent1">
+              <a:shade val="15000"/>
+            </a:schemeClr>
+          </a:lnRef>
+          <a:fillRef idx="1">
+            <a:schemeClr val="accent1"/>
+          </a:fillRef>
+          <a:effectRef idx="0">
+            <a:schemeClr val="accent1"/>
+          </a:effectRef>
+          <a:fontRef idx="minor">
+            <a:schemeClr val="lt1"/>
+          </a:fontRef>
+        </p:style>
+        <p:txBody>
+          <a:bodyPr rtlCol="0" anchor="ctr"/>
+          <a:lstStyle/>
+          <a:p>
+            <a:pPr algn="ctr"/>
+            <a:endParaRPr lang="en-GB"/>
+          </a:p>
+        </p:txBody>
+      </p:sp>
+      <p:sp>
+        <p:nvSpPr>
+          <p:cNvPr id="23" name="Isosceles Triangle 22">
+            <a:extLst>
+              <a:ext uri="{FF2B5EF4-FFF2-40B4-BE49-F238E27FC236}">
+                <a16:creationId xmlns:a16="http://schemas.microsoft.com/office/drawing/2014/main" id="{028FB484-0C07-9E36-089F-B673E87B3FB8}"/>
+              </a:ext>
+            </a:extLst>
+          </p:cNvPr>
+          <p:cNvSpPr/>
+          <p:nvPr/>
+        </p:nvSpPr>
+        <p:spPr>
+          <a:xfrm>
+            <a:off x="919736" y="4581582"/>
+            <a:ext cx="1359785" cy="553622"/>
+          </a:xfrm>
+          <a:prstGeom prst="triangle">
+            <a:avLst/>
+          </a:prstGeom>
+          <a:ln>
+            <a:noFill/>
+          </a:ln>
+        </p:spPr>
+        <p:style>
+          <a:lnRef idx="2">
+            <a:schemeClr val="accent1">
+              <a:shade val="15000"/>
+            </a:schemeClr>
+          </a:lnRef>
+          <a:fillRef idx="1">
+            <a:schemeClr val="accent1"/>
+          </a:fillRef>
+          <a:effectRef idx="0">
+            <a:schemeClr val="accent1"/>
+          </a:effectRef>
+          <a:fontRef idx="minor">
+            <a:schemeClr val="lt1"/>
+          </a:fontRef>
+        </p:style>
+        <p:txBody>
+          <a:bodyPr rtlCol="0" anchor="ctr"/>
+          <a:lstStyle/>
+          <a:p>
+            <a:pPr algn="ctr"/>
+            <a:endParaRPr lang="en-GB"/>
+          </a:p>
+        </p:txBody>
+      </p:sp>
+      <p:sp>
+        <p:nvSpPr>
+          <p:cNvPr id="27" name="Freeform: Shape 26">
+            <a:extLst>
+              <a:ext uri="{FF2B5EF4-FFF2-40B4-BE49-F238E27FC236}">
+                <a16:creationId xmlns:a16="http://schemas.microsoft.com/office/drawing/2014/main" id="{B0E40B26-21E0-C2BE-04E9-E6372E1C9DD9}"/>
+              </a:ext>
+            </a:extLst>
+          </p:cNvPr>
+          <p:cNvSpPr/>
+          <p:nvPr/>
+        </p:nvSpPr>
+        <p:spPr>
+          <a:xfrm>
+            <a:off x="6497021" y="2645640"/>
+            <a:ext cx="1398494" cy="1122073"/>
+          </a:xfrm>
+          <a:custGeom>
+            <a:avLst/>
+            <a:gdLst>
+              <a:gd name="connsiteX0" fmla="*/ 0 w 1398494"/>
+              <a:gd name="connsiteY0" fmla="*/ 543515 h 1122073"/>
+              <a:gd name="connsiteX1" fmla="*/ 242047 w 1398494"/>
+              <a:gd name="connsiteY1" fmla="*/ 32527 h 1122073"/>
+              <a:gd name="connsiteX2" fmla="*/ 685800 w 1398494"/>
+              <a:gd name="connsiteY2" fmla="*/ 99762 h 1122073"/>
+              <a:gd name="connsiteX3" fmla="*/ 927847 w 1398494"/>
+              <a:gd name="connsiteY3" fmla="*/ 489727 h 1122073"/>
+              <a:gd name="connsiteX4" fmla="*/ 699247 w 1398494"/>
+              <a:gd name="connsiteY4" fmla="*/ 718327 h 1122073"/>
+              <a:gd name="connsiteX5" fmla="*/ 1021977 w 1398494"/>
+              <a:gd name="connsiteY5" fmla="*/ 852798 h 1122073"/>
+              <a:gd name="connsiteX6" fmla="*/ 739588 w 1398494"/>
+              <a:gd name="connsiteY6" fmla="*/ 987268 h 1122073"/>
+              <a:gd name="connsiteX7" fmla="*/ 1398494 w 1398494"/>
+              <a:gd name="connsiteY7" fmla="*/ 1121739 h 1122073"/>
+            </a:gdLst>
+            <a:ahLst/>
+            <a:cxnLst>
+              <a:cxn ang="0">
+                <a:pos x="connsiteX0" y="connsiteY0"/>
+              </a:cxn>
+              <a:cxn ang="0">
+                <a:pos x="connsiteX1" y="connsiteY1"/>
+              </a:cxn>
+              <a:cxn ang="0">
+                <a:pos x="connsiteX2" y="connsiteY2"/>
+              </a:cxn>
+              <a:cxn ang="0">
+                <a:pos x="connsiteX3" y="connsiteY3"/>
+              </a:cxn>
+              <a:cxn ang="0">
+                <a:pos x="connsiteX4" y="connsiteY4"/>
+              </a:cxn>
+              <a:cxn ang="0">
+                <a:pos x="connsiteX5" y="connsiteY5"/>
+              </a:cxn>
+              <a:cxn ang="0">
+                <a:pos x="connsiteX6" y="connsiteY6"/>
+              </a:cxn>
+              <a:cxn ang="0">
+                <a:pos x="connsiteX7" y="connsiteY7"/>
+              </a:cxn>
+            </a:cxnLst>
+            <a:rect l="l" t="t" r="r" b="b"/>
+            <a:pathLst>
+              <a:path w="1398494" h="1122073">
+                <a:moveTo>
+                  <a:pt x="0" y="543515"/>
+                </a:moveTo>
+                <a:cubicBezTo>
+                  <a:pt x="63873" y="325000"/>
+                  <a:pt x="127747" y="106486"/>
+                  <a:pt x="242047" y="32527"/>
+                </a:cubicBezTo>
+                <a:cubicBezTo>
+                  <a:pt x="356347" y="-41432"/>
+                  <a:pt x="571500" y="23562"/>
+                  <a:pt x="685800" y="99762"/>
+                </a:cubicBezTo>
+                <a:cubicBezTo>
+                  <a:pt x="800100" y="175962"/>
+                  <a:pt x="925606" y="386633"/>
+                  <a:pt x="927847" y="489727"/>
+                </a:cubicBezTo>
+                <a:cubicBezTo>
+                  <a:pt x="930088" y="592821"/>
+                  <a:pt x="683559" y="657815"/>
+                  <a:pt x="699247" y="718327"/>
+                </a:cubicBezTo>
+                <a:cubicBezTo>
+                  <a:pt x="714935" y="778839"/>
+                  <a:pt x="1015254" y="807975"/>
+                  <a:pt x="1021977" y="852798"/>
+                </a:cubicBezTo>
+                <a:cubicBezTo>
+                  <a:pt x="1028700" y="897621"/>
+                  <a:pt x="676835" y="942445"/>
+                  <a:pt x="739588" y="987268"/>
+                </a:cubicBezTo>
+                <a:cubicBezTo>
+                  <a:pt x="802341" y="1032092"/>
+                  <a:pt x="1329018" y="1128462"/>
+                  <a:pt x="1398494" y="1121739"/>
+                </a:cubicBezTo>
+              </a:path>
+            </a:pathLst>
+          </a:custGeom>
+          <a:noFill/>
+          <a:ln w="101600">
+            <a:solidFill>
+              <a:srgbClr val="996633"/>
+            </a:solidFill>
+          </a:ln>
+        </p:spPr>
+        <p:style>
+          <a:lnRef idx="2">
+            <a:schemeClr val="accent1">
+              <a:shade val="15000"/>
+            </a:schemeClr>
+          </a:lnRef>
+          <a:fillRef idx="1">
+            <a:schemeClr val="accent1"/>
+          </a:fillRef>
+          <a:effectRef idx="0">
+            <a:schemeClr val="accent1"/>
+          </a:effectRef>
+          <a:fontRef idx="minor">
+            <a:schemeClr val="lt1"/>
+          </a:fontRef>
+        </p:style>
+        <p:txBody>
+          <a:bodyPr rtlCol="0" anchor="ctr"/>
+          <a:lstStyle/>
+          <a:p>
+            <a:pPr algn="ctr"/>
+            <a:endParaRPr lang="en-GB"/>
+          </a:p>
+        </p:txBody>
+      </p:sp>
+      <p:sp>
+        <p:nvSpPr>
+          <p:cNvPr id="26" name="Trapezoid 25">
+            <a:extLst>
+              <a:ext uri="{FF2B5EF4-FFF2-40B4-BE49-F238E27FC236}">
+                <a16:creationId xmlns:a16="http://schemas.microsoft.com/office/drawing/2014/main" id="{CEE1803A-2129-D414-2C1D-C7DA64F1A04A}"/>
+              </a:ext>
+            </a:extLst>
+          </p:cNvPr>
+          <p:cNvSpPr/>
+          <p:nvPr/>
+        </p:nvSpPr>
+        <p:spPr>
+          <a:xfrm flipV="1">
+            <a:off x="6037929" y="2949978"/>
+            <a:ext cx="938369" cy="886741"/>
+          </a:xfrm>
+          <a:prstGeom prst="trapezoid">
+            <a:avLst>
+              <a:gd name="adj" fmla="val 20553"/>
+            </a:avLst>
+          </a:prstGeom>
+          <a:solidFill>
+            <a:schemeClr val="accent6">
+              <a:lumMod val="50000"/>
+            </a:schemeClr>
+          </a:solidFill>
+          <a:ln>
+            <a:noFill/>
+          </a:ln>
+        </p:spPr>
+        <p:style>
+          <a:lnRef idx="2">
+            <a:schemeClr val="accent1">
+              <a:shade val="15000"/>
+            </a:schemeClr>
+          </a:lnRef>
+          <a:fillRef idx="1">
+            <a:schemeClr val="accent1"/>
+          </a:fillRef>
+          <a:effectRef idx="0">
+            <a:schemeClr val="accent1"/>
+          </a:effectRef>
+          <a:fontRef idx="minor">
+            <a:schemeClr val="lt1"/>
+          </a:fontRef>
+        </p:style>
+        <p:txBody>
+          <a:bodyPr rtlCol="0" anchor="ctr"/>
+          <a:lstStyle/>
+          <a:p>
+            <a:pPr algn="ctr"/>
+            <a:endParaRPr lang="en-GB"/>
+          </a:p>
+        </p:txBody>
+      </p:sp>
+      <p:sp>
+        <p:nvSpPr>
+          <p:cNvPr id="28" name="Isosceles Triangle 27">
+            <a:extLst>
+              <a:ext uri="{FF2B5EF4-FFF2-40B4-BE49-F238E27FC236}">
+                <a16:creationId xmlns:a16="http://schemas.microsoft.com/office/drawing/2014/main" id="{35EC5AD5-C9C0-6597-8276-AC6F5604991D}"/>
+              </a:ext>
+            </a:extLst>
+          </p:cNvPr>
+          <p:cNvSpPr/>
+          <p:nvPr/>
+        </p:nvSpPr>
+        <p:spPr>
+          <a:xfrm>
+            <a:off x="6819546" y="2274325"/>
+            <a:ext cx="1050588" cy="471164"/>
+          </a:xfrm>
+          <a:prstGeom prst="triangle">
+            <a:avLst/>
+          </a:prstGeom>
+          <a:ln>
+            <a:noFill/>
+          </a:ln>
+        </p:spPr>
+        <p:style>
+          <a:lnRef idx="2">
+            <a:schemeClr val="accent1">
+              <a:shade val="15000"/>
+            </a:schemeClr>
+          </a:lnRef>
+          <a:fillRef idx="1">
+            <a:schemeClr val="accent1"/>
+          </a:fillRef>
+          <a:effectRef idx="0">
+            <a:schemeClr val="accent1"/>
+          </a:effectRef>
+          <a:fontRef idx="minor">
+            <a:schemeClr val="lt1"/>
+          </a:fontRef>
+        </p:style>
+        <p:txBody>
+          <a:bodyPr rtlCol="0" anchor="ctr"/>
+          <a:lstStyle/>
+          <a:p>
+            <a:pPr algn="ctr"/>
+            <a:endParaRPr lang="en-GB"/>
+          </a:p>
+        </p:txBody>
+      </p:sp>
+      <p:sp>
+        <p:nvSpPr>
+          <p:cNvPr id="29" name="Isosceles Triangle 28">
+            <a:extLst>
+              <a:ext uri="{FF2B5EF4-FFF2-40B4-BE49-F238E27FC236}">
+                <a16:creationId xmlns:a16="http://schemas.microsoft.com/office/drawing/2014/main" id="{B056FC23-AD84-3346-0119-9B3E923F64A8}"/>
+              </a:ext>
+            </a:extLst>
+          </p:cNvPr>
+          <p:cNvSpPr/>
+          <p:nvPr/>
+        </p:nvSpPr>
+        <p:spPr>
+          <a:xfrm>
+            <a:off x="6098714" y="2466846"/>
+            <a:ext cx="643062" cy="312781"/>
+          </a:xfrm>
+          <a:prstGeom prst="triangle">
+            <a:avLst/>
+          </a:prstGeom>
+          <a:ln>
+            <a:noFill/>
+          </a:ln>
+        </p:spPr>
+        <p:style>
+          <a:lnRef idx="2">
+            <a:schemeClr val="accent1">
+              <a:shade val="15000"/>
+            </a:schemeClr>
+          </a:lnRef>
+          <a:fillRef idx="1">
+            <a:schemeClr val="accent1"/>
+          </a:fillRef>
+          <a:effectRef idx="0">
+            <a:schemeClr val="accent1"/>
+          </a:effectRef>
+          <a:fontRef idx="minor">
+            <a:schemeClr val="lt1"/>
+          </a:fontRef>
+        </p:style>
+        <p:txBody>
+          <a:bodyPr rtlCol="0" anchor="ctr"/>
+          <a:lstStyle/>
+          <a:p>
+            <a:pPr algn="ctr"/>
+            <a:endParaRPr lang="en-GB"/>
+          </a:p>
+        </p:txBody>
+      </p:sp>
+      <p:sp>
+        <p:nvSpPr>
+          <p:cNvPr id="30" name="Isosceles Triangle 29">
+            <a:extLst>
+              <a:ext uri="{FF2B5EF4-FFF2-40B4-BE49-F238E27FC236}">
+                <a16:creationId xmlns:a16="http://schemas.microsoft.com/office/drawing/2014/main" id="{6A08FD15-C66B-8CB1-A7A7-8FED5A3501C6}"/>
+              </a:ext>
+            </a:extLst>
+          </p:cNvPr>
+          <p:cNvSpPr/>
+          <p:nvPr/>
+        </p:nvSpPr>
+        <p:spPr>
+          <a:xfrm>
+            <a:off x="6807686" y="2929704"/>
+            <a:ext cx="651180" cy="441202"/>
+          </a:xfrm>
+          <a:prstGeom prst="triangle">
+            <a:avLst/>
+          </a:prstGeom>
+          <a:ln>
+            <a:noFill/>
+          </a:ln>
+        </p:spPr>
+        <p:style>
+          <a:lnRef idx="2">
+            <a:schemeClr val="accent1">
+              <a:shade val="15000"/>
+            </a:schemeClr>
+          </a:lnRef>
+          <a:fillRef idx="1">
+            <a:schemeClr val="accent1"/>
+          </a:fillRef>
+          <a:effectRef idx="0">
+            <a:schemeClr val="accent1"/>
+          </a:effectRef>
+          <a:fontRef idx="minor">
+            <a:schemeClr val="lt1"/>
+          </a:fontRef>
+        </p:style>
+        <p:txBody>
+          <a:bodyPr rtlCol="0" anchor="ctr"/>
+          <a:lstStyle/>
+          <a:p>
+            <a:pPr algn="ctr"/>
+            <a:endParaRPr lang="en-GB"/>
+          </a:p>
+        </p:txBody>
+      </p:sp>
+      <p:sp>
+        <p:nvSpPr>
+          <p:cNvPr id="31" name="Isosceles Triangle 30">
+            <a:extLst>
+              <a:ext uri="{FF2B5EF4-FFF2-40B4-BE49-F238E27FC236}">
+                <a16:creationId xmlns:a16="http://schemas.microsoft.com/office/drawing/2014/main" id="{6879D670-A028-604F-1809-8BD75A672B76}"/>
+              </a:ext>
+            </a:extLst>
+          </p:cNvPr>
+          <p:cNvSpPr/>
+          <p:nvPr/>
+        </p:nvSpPr>
+        <p:spPr>
+          <a:xfrm>
+            <a:off x="7435390" y="3391361"/>
+            <a:ext cx="858432" cy="565398"/>
+          </a:xfrm>
+          <a:prstGeom prst="triangle">
+            <a:avLst/>
+          </a:prstGeom>
+          <a:ln>
+            <a:noFill/>
+          </a:ln>
+        </p:spPr>
+        <p:style>
+          <a:lnRef idx="2">
+            <a:schemeClr val="accent1">
+              <a:shade val="15000"/>
+            </a:schemeClr>
+          </a:lnRef>
+          <a:fillRef idx="1">
+            <a:schemeClr val="accent1"/>
+          </a:fillRef>
+          <a:effectRef idx="0">
+            <a:schemeClr val="accent1"/>
+          </a:effectRef>
+          <a:fontRef idx="minor">
+            <a:schemeClr val="lt1"/>
+          </a:fontRef>
+        </p:style>
+        <p:txBody>
+          <a:bodyPr rtlCol="0" anchor="ctr"/>
+          <a:lstStyle/>
+          <a:p>
+            <a:pPr algn="ctr"/>
+            <a:endParaRPr lang="en-GB"/>
+          </a:p>
+        </p:txBody>
+      </p:sp>
+      <p:sp>
+        <p:nvSpPr>
+          <p:cNvPr id="33" name="Freeform: Shape 32">
+            <a:extLst>
+              <a:ext uri="{FF2B5EF4-FFF2-40B4-BE49-F238E27FC236}">
+                <a16:creationId xmlns:a16="http://schemas.microsoft.com/office/drawing/2014/main" id="{17FAC7FB-5F6C-76BB-8329-D5414813E0EB}"/>
+              </a:ext>
+            </a:extLst>
+          </p:cNvPr>
+          <p:cNvSpPr/>
+          <p:nvPr/>
+        </p:nvSpPr>
+        <p:spPr>
+          <a:xfrm>
+            <a:off x="6048910" y="4919631"/>
+            <a:ext cx="723935" cy="1133127"/>
+          </a:xfrm>
+          <a:custGeom>
+            <a:avLst/>
+            <a:gdLst>
+              <a:gd name="connsiteX0" fmla="*/ 408161 w 723935"/>
+              <a:gd name="connsiteY0" fmla="*/ 1101341 h 1101341"/>
+              <a:gd name="connsiteX1" fmla="*/ 520702 w 723935"/>
+              <a:gd name="connsiteY1" fmla="*/ 693378 h 1101341"/>
+              <a:gd name="connsiteX2" fmla="*/ 14265 w 723935"/>
+              <a:gd name="connsiteY2" fmla="*/ 172874 h 1101341"/>
+              <a:gd name="connsiteX3" fmla="*/ 169010 w 723935"/>
+              <a:gd name="connsiteY3" fmla="*/ 215077 h 1101341"/>
+              <a:gd name="connsiteX4" fmla="*/ 478499 w 723935"/>
+              <a:gd name="connsiteY4" fmla="*/ 201009 h 1101341"/>
+              <a:gd name="connsiteX5" fmla="*/ 717650 w 723935"/>
+              <a:gd name="connsiteY5" fmla="*/ 46264 h 1101341"/>
+              <a:gd name="connsiteX6" fmla="*/ 633244 w 723935"/>
+              <a:gd name="connsiteY6" fmla="*/ 4061 h 1101341"/>
+              <a:gd name="connsiteX7" fmla="*/ 408161 w 723935"/>
+              <a:gd name="connsiteY7" fmla="*/ 4061 h 1101341"/>
+            </a:gdLst>
+            <a:ahLst/>
+            <a:cxnLst>
+              <a:cxn ang="0">
+                <a:pos x="connsiteX0" y="connsiteY0"/>
+              </a:cxn>
+              <a:cxn ang="0">
+                <a:pos x="connsiteX1" y="connsiteY1"/>
+              </a:cxn>
+              <a:cxn ang="0">
+                <a:pos x="connsiteX2" y="connsiteY2"/>
+              </a:cxn>
+              <a:cxn ang="0">
+                <a:pos x="connsiteX3" y="connsiteY3"/>
+              </a:cxn>
+              <a:cxn ang="0">
+                <a:pos x="connsiteX4" y="connsiteY4"/>
+              </a:cxn>
+              <a:cxn ang="0">
+                <a:pos x="connsiteX5" y="connsiteY5"/>
+              </a:cxn>
+              <a:cxn ang="0">
+                <a:pos x="connsiteX6" y="connsiteY6"/>
+              </a:cxn>
+              <a:cxn ang="0">
+                <a:pos x="connsiteX7" y="connsiteY7"/>
+              </a:cxn>
+            </a:cxnLst>
+            <a:rect l="l" t="t" r="r" b="b"/>
+            <a:pathLst>
+              <a:path w="723935" h="1101341">
+                <a:moveTo>
+                  <a:pt x="408161" y="1101341"/>
+                </a:moveTo>
+                <a:cubicBezTo>
+                  <a:pt x="497256" y="974731"/>
+                  <a:pt x="586351" y="848122"/>
+                  <a:pt x="520702" y="693378"/>
+                </a:cubicBezTo>
+                <a:cubicBezTo>
+                  <a:pt x="455053" y="538634"/>
+                  <a:pt x="72880" y="252591"/>
+                  <a:pt x="14265" y="172874"/>
+                </a:cubicBezTo>
+                <a:cubicBezTo>
+                  <a:pt x="-44350" y="93157"/>
+                  <a:pt x="91638" y="210388"/>
+                  <a:pt x="169010" y="215077"/>
+                </a:cubicBezTo>
+                <a:cubicBezTo>
+                  <a:pt x="246382" y="219766"/>
+                  <a:pt x="387059" y="229144"/>
+                  <a:pt x="478499" y="201009"/>
+                </a:cubicBezTo>
+                <a:cubicBezTo>
+                  <a:pt x="569939" y="172874"/>
+                  <a:pt x="691859" y="79089"/>
+                  <a:pt x="717650" y="46264"/>
+                </a:cubicBezTo>
+                <a:cubicBezTo>
+                  <a:pt x="743441" y="13439"/>
+                  <a:pt x="684825" y="11095"/>
+                  <a:pt x="633244" y="4061"/>
+                </a:cubicBezTo>
+                <a:cubicBezTo>
+                  <a:pt x="581663" y="-2973"/>
+                  <a:pt x="494912" y="544"/>
+                  <a:pt x="408161" y="4061"/>
+                </a:cubicBezTo>
+              </a:path>
+            </a:pathLst>
+          </a:custGeom>
+          <a:noFill/>
+          <a:ln w="88900"/>
+        </p:spPr>
+        <p:style>
+          <a:lnRef idx="2">
+            <a:schemeClr val="accent1">
+              <a:shade val="15000"/>
+            </a:schemeClr>
+          </a:lnRef>
+          <a:fillRef idx="1">
+            <a:schemeClr val="accent1"/>
+          </a:fillRef>
+          <a:effectRef idx="0">
+            <a:schemeClr val="accent1"/>
+          </a:effectRef>
+          <a:fontRef idx="minor">
+            <a:schemeClr val="lt1"/>
+          </a:fontRef>
+        </p:style>
+        <p:txBody>
+          <a:bodyPr rtlCol="0" anchor="ctr"/>
+          <a:lstStyle/>
+          <a:p>
+            <a:pPr algn="ctr"/>
+            <a:endParaRPr lang="en-GB"/>
+          </a:p>
+        </p:txBody>
+      </p:sp>
+      <p:sp>
+        <p:nvSpPr>
+          <p:cNvPr id="34" name="Isosceles Triangle 33">
+            <a:extLst>
+              <a:ext uri="{FF2B5EF4-FFF2-40B4-BE49-F238E27FC236}">
+                <a16:creationId xmlns:a16="http://schemas.microsoft.com/office/drawing/2014/main" id="{8B34B69E-6200-0A4F-1D6A-1615D536189B}"/>
+              </a:ext>
+            </a:extLst>
+          </p:cNvPr>
+          <p:cNvSpPr/>
+          <p:nvPr/>
+        </p:nvSpPr>
+        <p:spPr>
+          <a:xfrm rot="897493">
+            <a:off x="6314640" y="4702728"/>
+            <a:ext cx="843548" cy="349757"/>
+          </a:xfrm>
+          <a:prstGeom prst="triangle">
+            <a:avLst>
+              <a:gd name="adj" fmla="val 32277"/>
+            </a:avLst>
+          </a:prstGeom>
+          <a:ln>
+            <a:noFill/>
+          </a:ln>
+        </p:spPr>
+        <p:style>
+          <a:lnRef idx="2">
+            <a:schemeClr val="accent1">
+              <a:shade val="15000"/>
+            </a:schemeClr>
+          </a:lnRef>
+          <a:fillRef idx="1">
+            <a:schemeClr val="accent1"/>
+          </a:fillRef>
+          <a:effectRef idx="0">
+            <a:schemeClr val="accent1"/>
+          </a:effectRef>
+          <a:fontRef idx="minor">
+            <a:schemeClr val="lt1"/>
+          </a:fontRef>
+        </p:style>
+        <p:txBody>
+          <a:bodyPr rtlCol="0" anchor="ctr"/>
+          <a:lstStyle/>
+          <a:p>
+            <a:pPr algn="ctr"/>
+            <a:endParaRPr lang="en-GB"/>
+          </a:p>
+        </p:txBody>
+      </p:sp>
+      <p:sp>
+        <p:nvSpPr>
+          <p:cNvPr id="32" name="Trapezoid 31">
+            <a:extLst>
+              <a:ext uri="{FF2B5EF4-FFF2-40B4-BE49-F238E27FC236}">
+                <a16:creationId xmlns:a16="http://schemas.microsoft.com/office/drawing/2014/main" id="{FEAAF144-F458-9FB3-9F36-F49D14EDB6CB}"/>
+              </a:ext>
+            </a:extLst>
+          </p:cNvPr>
+          <p:cNvSpPr/>
+          <p:nvPr/>
+        </p:nvSpPr>
+        <p:spPr>
+          <a:xfrm flipV="1">
+            <a:off x="5952216" y="5867940"/>
+            <a:ext cx="936058" cy="337450"/>
+          </a:xfrm>
+          <a:prstGeom prst="trapezoid">
+            <a:avLst>
+              <a:gd name="adj" fmla="val 30185"/>
+            </a:avLst>
+          </a:prstGeom>
+          <a:solidFill>
+            <a:schemeClr val="accent6">
+              <a:lumMod val="50000"/>
+            </a:schemeClr>
+          </a:solidFill>
+          <a:ln>
+            <a:noFill/>
+          </a:ln>
+        </p:spPr>
+        <p:style>
+          <a:lnRef idx="2">
+            <a:schemeClr val="accent1">
+              <a:shade val="15000"/>
+            </a:schemeClr>
+          </a:lnRef>
+          <a:fillRef idx="1">
+            <a:schemeClr val="accent1"/>
+          </a:fillRef>
+          <a:effectRef idx="0">
+            <a:schemeClr val="accent1"/>
+          </a:effectRef>
+          <a:fontRef idx="minor">
+            <a:schemeClr val="lt1"/>
+          </a:fontRef>
+        </p:style>
+        <p:txBody>
+          <a:bodyPr rtlCol="0" anchor="ctr"/>
+          <a:lstStyle/>
+          <a:p>
+            <a:pPr algn="ctr"/>
+            <a:endParaRPr lang="en-GB"/>
+          </a:p>
+        </p:txBody>
+      </p:sp>
+      <p:sp>
+        <p:nvSpPr>
+          <p:cNvPr id="35" name="Rectangle 34">
+            <a:extLst>
+              <a:ext uri="{FF2B5EF4-FFF2-40B4-BE49-F238E27FC236}">
+                <a16:creationId xmlns:a16="http://schemas.microsoft.com/office/drawing/2014/main" id="{336B7AE8-8971-5E04-1E92-A3B0A5CD35EE}"/>
+              </a:ext>
+            </a:extLst>
+          </p:cNvPr>
+          <p:cNvSpPr/>
+          <p:nvPr/>
+        </p:nvSpPr>
+        <p:spPr>
+          <a:xfrm>
+            <a:off x="7070912" y="372088"/>
+            <a:ext cx="3966882" cy="582653"/>
           </a:xfrm>
           <a:prstGeom prst="rect">
             <a:avLst/>
@@ -10154,57 +11137,7 @@
             <a:pPr algn="ctr"/>
             <a:r>
               <a:rPr lang="en-US" dirty="0"/>
-              <a:t>Image</a:t>
-            </a:r>
-            <a:endParaRPr lang="en-GB" dirty="0"/>
-          </a:p>
-        </p:txBody>
-      </p:sp>
-      <p:sp>
-        <p:nvSpPr>
-          <p:cNvPr id="20" name="Rectangle 19">
-            <a:extLst>
-              <a:ext uri="{FF2B5EF4-FFF2-40B4-BE49-F238E27FC236}">
-                <a16:creationId xmlns:a16="http://schemas.microsoft.com/office/drawing/2014/main" id="{E03CD264-A525-1F92-EB91-E3ECB3C18C88}"/>
-              </a:ext>
-            </a:extLst>
-          </p:cNvPr>
-          <p:cNvSpPr/>
-          <p:nvPr/>
-        </p:nvSpPr>
-        <p:spPr>
-          <a:xfrm>
-            <a:off x="7070912" y="372088"/>
-            <a:ext cx="3966882" cy="582653"/>
-          </a:xfrm>
-          <a:prstGeom prst="rect">
-            <a:avLst/>
-          </a:prstGeom>
-        </p:spPr>
-        <p:style>
-          <a:lnRef idx="2">
-            <a:schemeClr val="accent4">
-              <a:shade val="15000"/>
-            </a:schemeClr>
-          </a:lnRef>
-          <a:fillRef idx="1">
-            <a:schemeClr val="accent4"/>
-          </a:fillRef>
-          <a:effectRef idx="0">
-            <a:schemeClr val="accent4"/>
-          </a:effectRef>
-          <a:fontRef idx="minor">
-            <a:schemeClr val="lt1"/>
-          </a:fontRef>
-        </p:style>
-        <p:txBody>
-          <a:bodyPr rtlCol="0" anchor="ctr"/>
-          <a:lstStyle/>
-          <a:p>
-            <a:pPr algn="ctr"/>
-            <a:r>
-              <a:rPr lang="en-US" dirty="0"/>
-              <a:t>Add pictures</a:t>
+              <a:t>Good enough</a:t>
             </a:r>
             <a:endParaRPr lang="en-GB" dirty="0"/>
           </a:p>
@@ -10828,10 +11761,17 @@
           </a:p>
           <a:p>
             <a:r>
+              <a:rPr lang="en-GB" sz="1400" dirty="0"/>
+              <a:t>“</a:t>
+            </a:r>
+            <a:r>
               <a:rPr lang="en-GB" sz="1400" dirty="0" err="1"/>
               <a:t>Nonsai</a:t>
             </a:r>
-            <a:endParaRPr lang="en-GB" sz="1400" dirty="0"/>
+            <a:r>
+              <a:rPr lang="en-GB" sz="1400" dirty="0"/>
+              <a:t>”</a:t>
+            </a:r>
           </a:p>
           <a:p>
             <a:r>
@@ -33237,8 +34177,8 @@
         </p:nvSpPr>
         <p:spPr>
           <a:xfrm>
-            <a:off x="8734211" y="560347"/>
-            <a:ext cx="908458" cy="582653"/>
+            <a:off x="5897810" y="940066"/>
+            <a:ext cx="1149979" cy="582653"/>
           </a:xfrm>
           <a:prstGeom prst="rect">
             <a:avLst/>
@@ -33481,7 +34421,7 @@
             </a:pPr>
             <a:r>
               <a:rPr lang="en-US" dirty="0"/>
-              <a:t>Sun</a:t>
+              <a:t>Sunlight</a:t>
             </a:r>
             <a:endParaRPr lang="en-GB" dirty="0"/>
           </a:p>
@@ -35562,10 +36502,10 @@
       </p:sp>
       <p:sp>
         <p:nvSpPr>
-          <p:cNvPr id="61" name="Rectangle 60">
+          <p:cNvPr id="3" name="Rectangle 2">
             <a:extLst>
               <a:ext uri="{FF2B5EF4-FFF2-40B4-BE49-F238E27FC236}">
-                <a16:creationId xmlns:a16="http://schemas.microsoft.com/office/drawing/2014/main" id="{E8EE0B44-8255-F746-B4EF-37162BB08D6E}"/>
+                <a16:creationId xmlns:a16="http://schemas.microsoft.com/office/drawing/2014/main" id="{B05B3308-3AEB-09DF-29FB-427646E60869}"/>
               </a:ext>
             </a:extLst>
           </p:cNvPr>

</xml_diff>

<commit_message>
Minor corrections to Lifecycle slide Added more detailed "thoughts" note to Pruning slide in lieu of actual content
</commit_message>
<xml_diff>
--- a/WGCourse/Bonsai On A Budget (running).pptx
+++ b/WGCourse/Bonsai On A Budget (running).pptx
@@ -154,6 +154,30 @@
         <a:r>
           <a:rPr lang="en-GB"/>
           <a:t>Need to add a "why study bonsai" slide prior to this.  (Also including definition of bonsai over from "Art &amp; Science" slide.)</a:t>
+        </a:r>
+      </a:p>
+    </p188:txBody>
+  </p188:cm>
+</p188:cmLst>
+</file>
+
+<file path=ppt/comments/modernComment_111_9284A4A2.xml><?xml version="1.0" encoding="utf-8"?>
+<p188:cmLst xmlns:a="http://schemas.openxmlformats.org/drawingml/2006/main" xmlns:r="http://schemas.openxmlformats.org/officeDocument/2006/relationships" xmlns:p188="http://schemas.microsoft.com/office/powerpoint/2018/8/main">
+  <p188:cm id="{468DC042-6607-46E4-B491-BB63E5F9B9CC}" authorId="{49000DBD-DD57-B9F5-1E22-669DF19DD1E1}" created="2024-06-02T18:12:58.882">
+    <pc:sldMkLst xmlns:pc="http://schemas.microsoft.com/office/powerpoint/2013/main/command">
+      <pc:docMk/>
+      <pc:sldMk cId="2458166434" sldId="273"/>
+    </pc:sldMkLst>
+    <p188:txBody>
+      <a:bodyPr/>
+      <a:lstStyle/>
+      <a:p>
+        <a:r>
+          <a:rPr lang="en-GB"/>
+          <a:t>I'm still getting my head round how broadleaf, pine and cupressaceae vary.  Perhaps:
+1. structural pruning - group pine and cypress as lacking epicormic buds; these require extra shenanigans to replace overly-large branches
+2. pruning for ramification - group broadleaf and pine as similar; with cypress you're thinning out a "pre-ramified" branch
+Either way: need a precursor slide on reasons for pruning &amp; types thereof (poss. together with wiring? i.e. which shaping forces are replicated).   Also a successor slide for seasonality.</a:t>
         </a:r>
       </a:p>
     </p188:txBody>
@@ -12922,16 +12946,16 @@
         </p:nvSpPr>
         <p:spPr>
           <a:xfrm rot="10800000">
-            <a:off x="4821818" y="2942432"/>
-            <a:ext cx="3468572" cy="3266518"/>
+            <a:off x="5051671" y="3331744"/>
+            <a:ext cx="2848026" cy="2288514"/>
           </a:xfrm>
           <a:prstGeom prst="circularArrow">
             <a:avLst>
-              <a:gd name="adj1" fmla="val 7535"/>
-              <a:gd name="adj2" fmla="val 1142319"/>
-              <a:gd name="adj3" fmla="val 20457680"/>
+              <a:gd name="adj1" fmla="val 8803"/>
+              <a:gd name="adj2" fmla="val 1035701"/>
+              <a:gd name="adj3" fmla="val 20525840"/>
               <a:gd name="adj4" fmla="val 10800000"/>
-              <a:gd name="adj5" fmla="val 12500"/>
+              <a:gd name="adj5" fmla="val 12358"/>
             </a:avLst>
           </a:prstGeom>
         </p:spPr>
@@ -12964,272 +12988,6 @@
       </p:sp>
       <p:sp>
         <p:nvSpPr>
-          <p:cNvPr id="41" name="Content Placeholder 14">
-            <a:extLst>
-              <a:ext uri="{FF2B5EF4-FFF2-40B4-BE49-F238E27FC236}">
-                <a16:creationId xmlns:a16="http://schemas.microsoft.com/office/drawing/2014/main" id="{0AD0D044-A4E5-B1E0-CF5F-BE827072EEA6}"/>
-              </a:ext>
-            </a:extLst>
-          </p:cNvPr>
-          <p:cNvSpPr txBox="1">
-            <a:spLocks/>
-          </p:cNvSpPr>
-          <p:nvPr/>
-        </p:nvSpPr>
-        <p:spPr>
-          <a:xfrm>
-            <a:off x="5789520" y="5870192"/>
-            <a:ext cx="1604887" cy="714245"/>
-          </a:xfrm>
-          <a:prstGeom prst="rect">
-            <a:avLst/>
-          </a:prstGeom>
-        </p:spPr>
-        <p:txBody>
-          <a:bodyPr vert="horz" lIns="91440" tIns="45720" rIns="91440" bIns="45720" rtlCol="0">
-            <a:normAutofit/>
-          </a:bodyPr>
-          <a:lstStyle>
-            <a:lvl1pPr marL="342900" indent="-342900" algn="l" defTabSz="457200" rtl="0" eaLnBrk="1" latinLnBrk="0" hangingPunct="1">
-              <a:spcBef>
-                <a:spcPts val="1000"/>
-              </a:spcBef>
-              <a:spcAft>
-                <a:spcPts val="0"/>
-              </a:spcAft>
-              <a:buClr>
-                <a:schemeClr val="accent1"/>
-              </a:buClr>
-              <a:buSzPct val="80000"/>
-              <a:buFont typeface="Wingdings 3" charset="2"/>
-              <a:buChar char=""/>
-              <a:defRPr sz="1800" kern="1200">
-                <a:solidFill>
-                  <a:schemeClr val="tx1">
-                    <a:lumMod val="75000"/>
-                    <a:lumOff val="25000"/>
-                  </a:schemeClr>
-                </a:solidFill>
-                <a:latin typeface="+mn-lt"/>
-                <a:ea typeface="+mn-ea"/>
-                <a:cs typeface="+mn-cs"/>
-              </a:defRPr>
-            </a:lvl1pPr>
-            <a:lvl2pPr marL="742950" indent="-285750" algn="l" defTabSz="457200" rtl="0" eaLnBrk="1" latinLnBrk="0" hangingPunct="1">
-              <a:spcBef>
-                <a:spcPts val="1000"/>
-              </a:spcBef>
-              <a:spcAft>
-                <a:spcPts val="0"/>
-              </a:spcAft>
-              <a:buClr>
-                <a:schemeClr val="accent1"/>
-              </a:buClr>
-              <a:buSzPct val="80000"/>
-              <a:buFont typeface="Wingdings 3" charset="2"/>
-              <a:buChar char=""/>
-              <a:defRPr sz="1600" kern="1200">
-                <a:solidFill>
-                  <a:schemeClr val="tx1">
-                    <a:lumMod val="75000"/>
-                    <a:lumOff val="25000"/>
-                  </a:schemeClr>
-                </a:solidFill>
-                <a:latin typeface="+mn-lt"/>
-                <a:ea typeface="+mn-ea"/>
-                <a:cs typeface="+mn-cs"/>
-              </a:defRPr>
-            </a:lvl2pPr>
-            <a:lvl3pPr marL="1143000" indent="-228600" algn="l" defTabSz="457200" rtl="0" eaLnBrk="1" latinLnBrk="0" hangingPunct="1">
-              <a:spcBef>
-                <a:spcPts val="1000"/>
-              </a:spcBef>
-              <a:spcAft>
-                <a:spcPts val="0"/>
-              </a:spcAft>
-              <a:buClr>
-                <a:schemeClr val="accent1"/>
-              </a:buClr>
-              <a:buSzPct val="80000"/>
-              <a:buFont typeface="Wingdings 3" charset="2"/>
-              <a:buChar char=""/>
-              <a:defRPr sz="1400" kern="1200">
-                <a:solidFill>
-                  <a:schemeClr val="tx1">
-                    <a:lumMod val="75000"/>
-                    <a:lumOff val="25000"/>
-                  </a:schemeClr>
-                </a:solidFill>
-                <a:latin typeface="+mn-lt"/>
-                <a:ea typeface="+mn-ea"/>
-                <a:cs typeface="+mn-cs"/>
-              </a:defRPr>
-            </a:lvl3pPr>
-            <a:lvl4pPr marL="1600200" indent="-228600" algn="l" defTabSz="457200" rtl="0" eaLnBrk="1" latinLnBrk="0" hangingPunct="1">
-              <a:spcBef>
-                <a:spcPts val="1000"/>
-              </a:spcBef>
-              <a:spcAft>
-                <a:spcPts val="0"/>
-              </a:spcAft>
-              <a:buClr>
-                <a:schemeClr val="accent1"/>
-              </a:buClr>
-              <a:buSzPct val="80000"/>
-              <a:buFont typeface="Wingdings 3" charset="2"/>
-              <a:buChar char=""/>
-              <a:defRPr sz="1200" kern="1200">
-                <a:solidFill>
-                  <a:schemeClr val="tx1">
-                    <a:lumMod val="75000"/>
-                    <a:lumOff val="25000"/>
-                  </a:schemeClr>
-                </a:solidFill>
-                <a:latin typeface="+mn-lt"/>
-                <a:ea typeface="+mn-ea"/>
-                <a:cs typeface="+mn-cs"/>
-              </a:defRPr>
-            </a:lvl4pPr>
-            <a:lvl5pPr marL="2057400" indent="-228600" algn="l" defTabSz="457200" rtl="0" eaLnBrk="1" latinLnBrk="0" hangingPunct="1">
-              <a:spcBef>
-                <a:spcPts val="1000"/>
-              </a:spcBef>
-              <a:spcAft>
-                <a:spcPts val="0"/>
-              </a:spcAft>
-              <a:buClr>
-                <a:schemeClr val="accent1"/>
-              </a:buClr>
-              <a:buSzPct val="80000"/>
-              <a:buFont typeface="Wingdings 3" charset="2"/>
-              <a:buChar char=""/>
-              <a:defRPr sz="1200" kern="1200">
-                <a:solidFill>
-                  <a:schemeClr val="tx1">
-                    <a:lumMod val="75000"/>
-                    <a:lumOff val="25000"/>
-                  </a:schemeClr>
-                </a:solidFill>
-                <a:latin typeface="+mn-lt"/>
-                <a:ea typeface="+mn-ea"/>
-                <a:cs typeface="+mn-cs"/>
-              </a:defRPr>
-            </a:lvl5pPr>
-            <a:lvl6pPr marL="2514600" indent="-228600" algn="l" defTabSz="457200" rtl="0" eaLnBrk="1" latinLnBrk="0" hangingPunct="1">
-              <a:spcBef>
-                <a:spcPts val="1000"/>
-              </a:spcBef>
-              <a:spcAft>
-                <a:spcPts val="0"/>
-              </a:spcAft>
-              <a:buClr>
-                <a:schemeClr val="accent1"/>
-              </a:buClr>
-              <a:buSzPct val="80000"/>
-              <a:buFont typeface="Wingdings 3" charset="2"/>
-              <a:buChar char=""/>
-              <a:defRPr sz="1200" kern="1200">
-                <a:solidFill>
-                  <a:schemeClr val="tx1">
-                    <a:lumMod val="75000"/>
-                    <a:lumOff val="25000"/>
-                  </a:schemeClr>
-                </a:solidFill>
-                <a:latin typeface="+mn-lt"/>
-                <a:ea typeface="+mn-ea"/>
-                <a:cs typeface="+mn-cs"/>
-              </a:defRPr>
-            </a:lvl6pPr>
-            <a:lvl7pPr marL="2971800" indent="-228600" algn="l" defTabSz="457200" rtl="0" eaLnBrk="1" latinLnBrk="0" hangingPunct="1">
-              <a:spcBef>
-                <a:spcPts val="1000"/>
-              </a:spcBef>
-              <a:spcAft>
-                <a:spcPts val="0"/>
-              </a:spcAft>
-              <a:buClr>
-                <a:schemeClr val="accent1"/>
-              </a:buClr>
-              <a:buSzPct val="80000"/>
-              <a:buFont typeface="Wingdings 3" charset="2"/>
-              <a:buChar char=""/>
-              <a:defRPr sz="1200" kern="1200">
-                <a:solidFill>
-                  <a:schemeClr val="tx1">
-                    <a:lumMod val="75000"/>
-                    <a:lumOff val="25000"/>
-                  </a:schemeClr>
-                </a:solidFill>
-                <a:latin typeface="+mn-lt"/>
-                <a:ea typeface="+mn-ea"/>
-                <a:cs typeface="+mn-cs"/>
-              </a:defRPr>
-            </a:lvl7pPr>
-            <a:lvl8pPr marL="3429000" indent="-228600" algn="l" defTabSz="457200" rtl="0" eaLnBrk="1" latinLnBrk="0" hangingPunct="1">
-              <a:spcBef>
-                <a:spcPts val="1000"/>
-              </a:spcBef>
-              <a:spcAft>
-                <a:spcPts val="0"/>
-              </a:spcAft>
-              <a:buClr>
-                <a:schemeClr val="accent1"/>
-              </a:buClr>
-              <a:buSzPct val="80000"/>
-              <a:buFont typeface="Wingdings 3" charset="2"/>
-              <a:buChar char=""/>
-              <a:defRPr sz="1200" kern="1200">
-                <a:solidFill>
-                  <a:schemeClr val="tx1">
-                    <a:lumMod val="75000"/>
-                    <a:lumOff val="25000"/>
-                  </a:schemeClr>
-                </a:solidFill>
-                <a:latin typeface="+mn-lt"/>
-                <a:ea typeface="+mn-ea"/>
-                <a:cs typeface="+mn-cs"/>
-              </a:defRPr>
-            </a:lvl8pPr>
-            <a:lvl9pPr marL="3886200" indent="-228600" algn="l" defTabSz="457200" rtl="0" eaLnBrk="1" latinLnBrk="0" hangingPunct="1">
-              <a:spcBef>
-                <a:spcPts val="1000"/>
-              </a:spcBef>
-              <a:spcAft>
-                <a:spcPts val="0"/>
-              </a:spcAft>
-              <a:buClr>
-                <a:schemeClr val="accent1"/>
-              </a:buClr>
-              <a:buSzPct val="80000"/>
-              <a:buFont typeface="Wingdings 3" charset="2"/>
-              <a:buChar char=""/>
-              <a:defRPr sz="1200" kern="1200">
-                <a:solidFill>
-                  <a:schemeClr val="tx1">
-                    <a:lumMod val="75000"/>
-                    <a:lumOff val="25000"/>
-                  </a:schemeClr>
-                </a:solidFill>
-                <a:latin typeface="+mn-lt"/>
-                <a:ea typeface="+mn-ea"/>
-                <a:cs typeface="+mn-cs"/>
-              </a:defRPr>
-            </a:lvl9pPr>
-          </a:lstStyle>
-          <a:p>
-            <a:pPr marL="0" indent="0" algn="ctr">
-              <a:buNone/>
-            </a:pPr>
-            <a:r>
-              <a:rPr lang="en-US" sz="1400" dirty="0"/>
-              <a:t>Major intervention</a:t>
-            </a:r>
-            <a:endParaRPr lang="en-GB" sz="1400" dirty="0"/>
-          </a:p>
-        </p:txBody>
-      </p:sp>
-      <p:sp>
-        <p:nvSpPr>
           <p:cNvPr id="42" name="Arrow: Left-Right 41">
             <a:extLst>
               <a:ext uri="{FF2B5EF4-FFF2-40B4-BE49-F238E27FC236}">
@@ -13241,9 +12999,9 @@
           <p:nvPr/>
         </p:nvSpPr>
         <p:spPr>
-          <a:xfrm rot="20292248">
-            <a:off x="8882731" y="2909353"/>
-            <a:ext cx="1657707" cy="575621"/>
+          <a:xfrm rot="19956879">
+            <a:off x="8747812" y="2561806"/>
+            <a:ext cx="1184853" cy="575621"/>
           </a:xfrm>
           <a:prstGeom prst="leftRightArrow">
             <a:avLst/>
@@ -13864,7 +13622,7 @@
         </p:nvSpPr>
         <p:spPr>
           <a:xfrm>
-            <a:off x="8627972" y="5663620"/>
+            <a:off x="9204271" y="5719948"/>
             <a:ext cx="1604887" cy="714245"/>
           </a:xfrm>
           <a:prstGeom prst="rect">
@@ -14667,6 +14425,566 @@
               <a:t>Sources</a:t>
             </a:r>
             <a:endParaRPr lang="en-GB" dirty="0"/>
+          </a:p>
+        </p:txBody>
+      </p:sp>
+      <p:sp>
+        <p:nvSpPr>
+          <p:cNvPr id="7" name="Content Placeholder 14">
+            <a:extLst>
+              <a:ext uri="{FF2B5EF4-FFF2-40B4-BE49-F238E27FC236}">
+                <a16:creationId xmlns:a16="http://schemas.microsoft.com/office/drawing/2014/main" id="{E05F1373-288F-7ED0-C790-4FB916610FC3}"/>
+              </a:ext>
+            </a:extLst>
+          </p:cNvPr>
+          <p:cNvSpPr txBox="1">
+            <a:spLocks/>
+          </p:cNvSpPr>
+          <p:nvPr/>
+        </p:nvSpPr>
+        <p:spPr>
+          <a:xfrm>
+            <a:off x="9924594" y="2274900"/>
+            <a:ext cx="1843387" cy="1042470"/>
+          </a:xfrm>
+          <a:prstGeom prst="rect">
+            <a:avLst/>
+          </a:prstGeom>
+        </p:spPr>
+        <p:txBody>
+          <a:bodyPr vert="horz" lIns="91440" tIns="45720" rIns="91440" bIns="45720" rtlCol="0">
+            <a:normAutofit/>
+          </a:bodyPr>
+          <a:lstStyle>
+            <a:lvl1pPr marL="342900" indent="-342900" algn="l" defTabSz="457200" rtl="0" eaLnBrk="1" latinLnBrk="0" hangingPunct="1">
+              <a:spcBef>
+                <a:spcPts val="1000"/>
+              </a:spcBef>
+              <a:spcAft>
+                <a:spcPts val="0"/>
+              </a:spcAft>
+              <a:buClr>
+                <a:schemeClr val="accent1"/>
+              </a:buClr>
+              <a:buSzPct val="80000"/>
+              <a:buFont typeface="Wingdings 3" charset="2"/>
+              <a:buChar char=""/>
+              <a:defRPr sz="1800" kern="1200">
+                <a:solidFill>
+                  <a:schemeClr val="tx1">
+                    <a:lumMod val="75000"/>
+                    <a:lumOff val="25000"/>
+                  </a:schemeClr>
+                </a:solidFill>
+                <a:latin typeface="+mn-lt"/>
+                <a:ea typeface="+mn-ea"/>
+                <a:cs typeface="+mn-cs"/>
+              </a:defRPr>
+            </a:lvl1pPr>
+            <a:lvl2pPr marL="742950" indent="-285750" algn="l" defTabSz="457200" rtl="0" eaLnBrk="1" latinLnBrk="0" hangingPunct="1">
+              <a:spcBef>
+                <a:spcPts val="1000"/>
+              </a:spcBef>
+              <a:spcAft>
+                <a:spcPts val="0"/>
+              </a:spcAft>
+              <a:buClr>
+                <a:schemeClr val="accent1"/>
+              </a:buClr>
+              <a:buSzPct val="80000"/>
+              <a:buFont typeface="Wingdings 3" charset="2"/>
+              <a:buChar char=""/>
+              <a:defRPr sz="1600" kern="1200">
+                <a:solidFill>
+                  <a:schemeClr val="tx1">
+                    <a:lumMod val="75000"/>
+                    <a:lumOff val="25000"/>
+                  </a:schemeClr>
+                </a:solidFill>
+                <a:latin typeface="+mn-lt"/>
+                <a:ea typeface="+mn-ea"/>
+                <a:cs typeface="+mn-cs"/>
+              </a:defRPr>
+            </a:lvl2pPr>
+            <a:lvl3pPr marL="1143000" indent="-228600" algn="l" defTabSz="457200" rtl="0" eaLnBrk="1" latinLnBrk="0" hangingPunct="1">
+              <a:spcBef>
+                <a:spcPts val="1000"/>
+              </a:spcBef>
+              <a:spcAft>
+                <a:spcPts val="0"/>
+              </a:spcAft>
+              <a:buClr>
+                <a:schemeClr val="accent1"/>
+              </a:buClr>
+              <a:buSzPct val="80000"/>
+              <a:buFont typeface="Wingdings 3" charset="2"/>
+              <a:buChar char=""/>
+              <a:defRPr sz="1400" kern="1200">
+                <a:solidFill>
+                  <a:schemeClr val="tx1">
+                    <a:lumMod val="75000"/>
+                    <a:lumOff val="25000"/>
+                  </a:schemeClr>
+                </a:solidFill>
+                <a:latin typeface="+mn-lt"/>
+                <a:ea typeface="+mn-ea"/>
+                <a:cs typeface="+mn-cs"/>
+              </a:defRPr>
+            </a:lvl3pPr>
+            <a:lvl4pPr marL="1600200" indent="-228600" algn="l" defTabSz="457200" rtl="0" eaLnBrk="1" latinLnBrk="0" hangingPunct="1">
+              <a:spcBef>
+                <a:spcPts val="1000"/>
+              </a:spcBef>
+              <a:spcAft>
+                <a:spcPts val="0"/>
+              </a:spcAft>
+              <a:buClr>
+                <a:schemeClr val="accent1"/>
+              </a:buClr>
+              <a:buSzPct val="80000"/>
+              <a:buFont typeface="Wingdings 3" charset="2"/>
+              <a:buChar char=""/>
+              <a:defRPr sz="1200" kern="1200">
+                <a:solidFill>
+                  <a:schemeClr val="tx1">
+                    <a:lumMod val="75000"/>
+                    <a:lumOff val="25000"/>
+                  </a:schemeClr>
+                </a:solidFill>
+                <a:latin typeface="+mn-lt"/>
+                <a:ea typeface="+mn-ea"/>
+                <a:cs typeface="+mn-cs"/>
+              </a:defRPr>
+            </a:lvl4pPr>
+            <a:lvl5pPr marL="2057400" indent="-228600" algn="l" defTabSz="457200" rtl="0" eaLnBrk="1" latinLnBrk="0" hangingPunct="1">
+              <a:spcBef>
+                <a:spcPts val="1000"/>
+              </a:spcBef>
+              <a:spcAft>
+                <a:spcPts val="0"/>
+              </a:spcAft>
+              <a:buClr>
+                <a:schemeClr val="accent1"/>
+              </a:buClr>
+              <a:buSzPct val="80000"/>
+              <a:buFont typeface="Wingdings 3" charset="2"/>
+              <a:buChar char=""/>
+              <a:defRPr sz="1200" kern="1200">
+                <a:solidFill>
+                  <a:schemeClr val="tx1">
+                    <a:lumMod val="75000"/>
+                    <a:lumOff val="25000"/>
+                  </a:schemeClr>
+                </a:solidFill>
+                <a:latin typeface="+mn-lt"/>
+                <a:ea typeface="+mn-ea"/>
+                <a:cs typeface="+mn-cs"/>
+              </a:defRPr>
+            </a:lvl5pPr>
+            <a:lvl6pPr marL="2514600" indent="-228600" algn="l" defTabSz="457200" rtl="0" eaLnBrk="1" latinLnBrk="0" hangingPunct="1">
+              <a:spcBef>
+                <a:spcPts val="1000"/>
+              </a:spcBef>
+              <a:spcAft>
+                <a:spcPts val="0"/>
+              </a:spcAft>
+              <a:buClr>
+                <a:schemeClr val="accent1"/>
+              </a:buClr>
+              <a:buSzPct val="80000"/>
+              <a:buFont typeface="Wingdings 3" charset="2"/>
+              <a:buChar char=""/>
+              <a:defRPr sz="1200" kern="1200">
+                <a:solidFill>
+                  <a:schemeClr val="tx1">
+                    <a:lumMod val="75000"/>
+                    <a:lumOff val="25000"/>
+                  </a:schemeClr>
+                </a:solidFill>
+                <a:latin typeface="+mn-lt"/>
+                <a:ea typeface="+mn-ea"/>
+                <a:cs typeface="+mn-cs"/>
+              </a:defRPr>
+            </a:lvl6pPr>
+            <a:lvl7pPr marL="2971800" indent="-228600" algn="l" defTabSz="457200" rtl="0" eaLnBrk="1" latinLnBrk="0" hangingPunct="1">
+              <a:spcBef>
+                <a:spcPts val="1000"/>
+              </a:spcBef>
+              <a:spcAft>
+                <a:spcPts val="0"/>
+              </a:spcAft>
+              <a:buClr>
+                <a:schemeClr val="accent1"/>
+              </a:buClr>
+              <a:buSzPct val="80000"/>
+              <a:buFont typeface="Wingdings 3" charset="2"/>
+              <a:buChar char=""/>
+              <a:defRPr sz="1200" kern="1200">
+                <a:solidFill>
+                  <a:schemeClr val="tx1">
+                    <a:lumMod val="75000"/>
+                    <a:lumOff val="25000"/>
+                  </a:schemeClr>
+                </a:solidFill>
+                <a:latin typeface="+mn-lt"/>
+                <a:ea typeface="+mn-ea"/>
+                <a:cs typeface="+mn-cs"/>
+              </a:defRPr>
+            </a:lvl7pPr>
+            <a:lvl8pPr marL="3429000" indent="-228600" algn="l" defTabSz="457200" rtl="0" eaLnBrk="1" latinLnBrk="0" hangingPunct="1">
+              <a:spcBef>
+                <a:spcPts val="1000"/>
+              </a:spcBef>
+              <a:spcAft>
+                <a:spcPts val="0"/>
+              </a:spcAft>
+              <a:buClr>
+                <a:schemeClr val="accent1"/>
+              </a:buClr>
+              <a:buSzPct val="80000"/>
+              <a:buFont typeface="Wingdings 3" charset="2"/>
+              <a:buChar char=""/>
+              <a:defRPr sz="1200" kern="1200">
+                <a:solidFill>
+                  <a:schemeClr val="tx1">
+                    <a:lumMod val="75000"/>
+                    <a:lumOff val="25000"/>
+                  </a:schemeClr>
+                </a:solidFill>
+                <a:latin typeface="+mn-lt"/>
+                <a:ea typeface="+mn-ea"/>
+                <a:cs typeface="+mn-cs"/>
+              </a:defRPr>
+            </a:lvl8pPr>
+            <a:lvl9pPr marL="3886200" indent="-228600" algn="l" defTabSz="457200" rtl="0" eaLnBrk="1" latinLnBrk="0" hangingPunct="1">
+              <a:spcBef>
+                <a:spcPts val="1000"/>
+              </a:spcBef>
+              <a:spcAft>
+                <a:spcPts val="0"/>
+              </a:spcAft>
+              <a:buClr>
+                <a:schemeClr val="accent1"/>
+              </a:buClr>
+              <a:buSzPct val="80000"/>
+              <a:buFont typeface="Wingdings 3" charset="2"/>
+              <a:buChar char=""/>
+              <a:defRPr sz="1200" kern="1200">
+                <a:solidFill>
+                  <a:schemeClr val="tx1">
+                    <a:lumMod val="75000"/>
+                    <a:lumOff val="25000"/>
+                  </a:schemeClr>
+                </a:solidFill>
+                <a:latin typeface="+mn-lt"/>
+                <a:ea typeface="+mn-ea"/>
+                <a:cs typeface="+mn-cs"/>
+              </a:defRPr>
+            </a:lvl9pPr>
+          </a:lstStyle>
+          <a:p>
+            <a:pPr marL="0" indent="0">
+              <a:buNone/>
+            </a:pPr>
+            <a:r>
+              <a:rPr lang="en-US" sz="1400" dirty="0"/>
+              <a:t>Display</a:t>
+            </a:r>
+          </a:p>
+          <a:p>
+            <a:r>
+              <a:rPr lang="en-US" sz="1400" dirty="0"/>
+              <a:t>Exhibition</a:t>
+            </a:r>
+          </a:p>
+          <a:p>
+            <a:r>
+              <a:rPr lang="en-US" sz="1400" dirty="0"/>
+              <a:t>Photography</a:t>
+            </a:r>
+          </a:p>
+        </p:txBody>
+      </p:sp>
+      <p:sp>
+        <p:nvSpPr>
+          <p:cNvPr id="8" name="Content Placeholder 14">
+            <a:extLst>
+              <a:ext uri="{FF2B5EF4-FFF2-40B4-BE49-F238E27FC236}">
+                <a16:creationId xmlns:a16="http://schemas.microsoft.com/office/drawing/2014/main" id="{EBE6A40A-61A2-8680-63E9-7C52C7FC44BD}"/>
+              </a:ext>
+            </a:extLst>
+          </p:cNvPr>
+          <p:cNvSpPr txBox="1">
+            <a:spLocks/>
+          </p:cNvSpPr>
+          <p:nvPr/>
+        </p:nvSpPr>
+        <p:spPr>
+          <a:xfrm>
+            <a:off x="5670351" y="5400459"/>
+            <a:ext cx="2025420" cy="1368905"/>
+          </a:xfrm>
+          <a:prstGeom prst="rect">
+            <a:avLst/>
+          </a:prstGeom>
+        </p:spPr>
+        <p:txBody>
+          <a:bodyPr vert="horz" lIns="91440" tIns="45720" rIns="91440" bIns="45720" rtlCol="0">
+            <a:normAutofit/>
+          </a:bodyPr>
+          <a:lstStyle>
+            <a:lvl1pPr marL="342900" indent="-342900" algn="l" defTabSz="457200" rtl="0" eaLnBrk="1" latinLnBrk="0" hangingPunct="1">
+              <a:spcBef>
+                <a:spcPts val="1000"/>
+              </a:spcBef>
+              <a:spcAft>
+                <a:spcPts val="0"/>
+              </a:spcAft>
+              <a:buClr>
+                <a:schemeClr val="accent1"/>
+              </a:buClr>
+              <a:buSzPct val="80000"/>
+              <a:buFont typeface="Wingdings 3" charset="2"/>
+              <a:buChar char=""/>
+              <a:defRPr sz="1800" kern="1200">
+                <a:solidFill>
+                  <a:schemeClr val="tx1">
+                    <a:lumMod val="75000"/>
+                    <a:lumOff val="25000"/>
+                  </a:schemeClr>
+                </a:solidFill>
+                <a:latin typeface="+mn-lt"/>
+                <a:ea typeface="+mn-ea"/>
+                <a:cs typeface="+mn-cs"/>
+              </a:defRPr>
+            </a:lvl1pPr>
+            <a:lvl2pPr marL="742950" indent="-285750" algn="l" defTabSz="457200" rtl="0" eaLnBrk="1" latinLnBrk="0" hangingPunct="1">
+              <a:spcBef>
+                <a:spcPts val="1000"/>
+              </a:spcBef>
+              <a:spcAft>
+                <a:spcPts val="0"/>
+              </a:spcAft>
+              <a:buClr>
+                <a:schemeClr val="accent1"/>
+              </a:buClr>
+              <a:buSzPct val="80000"/>
+              <a:buFont typeface="Wingdings 3" charset="2"/>
+              <a:buChar char=""/>
+              <a:defRPr sz="1600" kern="1200">
+                <a:solidFill>
+                  <a:schemeClr val="tx1">
+                    <a:lumMod val="75000"/>
+                    <a:lumOff val="25000"/>
+                  </a:schemeClr>
+                </a:solidFill>
+                <a:latin typeface="+mn-lt"/>
+                <a:ea typeface="+mn-ea"/>
+                <a:cs typeface="+mn-cs"/>
+              </a:defRPr>
+            </a:lvl2pPr>
+            <a:lvl3pPr marL="1143000" indent="-228600" algn="l" defTabSz="457200" rtl="0" eaLnBrk="1" latinLnBrk="0" hangingPunct="1">
+              <a:spcBef>
+                <a:spcPts val="1000"/>
+              </a:spcBef>
+              <a:spcAft>
+                <a:spcPts val="0"/>
+              </a:spcAft>
+              <a:buClr>
+                <a:schemeClr val="accent1"/>
+              </a:buClr>
+              <a:buSzPct val="80000"/>
+              <a:buFont typeface="Wingdings 3" charset="2"/>
+              <a:buChar char=""/>
+              <a:defRPr sz="1400" kern="1200">
+                <a:solidFill>
+                  <a:schemeClr val="tx1">
+                    <a:lumMod val="75000"/>
+                    <a:lumOff val="25000"/>
+                  </a:schemeClr>
+                </a:solidFill>
+                <a:latin typeface="+mn-lt"/>
+                <a:ea typeface="+mn-ea"/>
+                <a:cs typeface="+mn-cs"/>
+              </a:defRPr>
+            </a:lvl3pPr>
+            <a:lvl4pPr marL="1600200" indent="-228600" algn="l" defTabSz="457200" rtl="0" eaLnBrk="1" latinLnBrk="0" hangingPunct="1">
+              <a:spcBef>
+                <a:spcPts val="1000"/>
+              </a:spcBef>
+              <a:spcAft>
+                <a:spcPts val="0"/>
+              </a:spcAft>
+              <a:buClr>
+                <a:schemeClr val="accent1"/>
+              </a:buClr>
+              <a:buSzPct val="80000"/>
+              <a:buFont typeface="Wingdings 3" charset="2"/>
+              <a:buChar char=""/>
+              <a:defRPr sz="1200" kern="1200">
+                <a:solidFill>
+                  <a:schemeClr val="tx1">
+                    <a:lumMod val="75000"/>
+                    <a:lumOff val="25000"/>
+                  </a:schemeClr>
+                </a:solidFill>
+                <a:latin typeface="+mn-lt"/>
+                <a:ea typeface="+mn-ea"/>
+                <a:cs typeface="+mn-cs"/>
+              </a:defRPr>
+            </a:lvl4pPr>
+            <a:lvl5pPr marL="2057400" indent="-228600" algn="l" defTabSz="457200" rtl="0" eaLnBrk="1" latinLnBrk="0" hangingPunct="1">
+              <a:spcBef>
+                <a:spcPts val="1000"/>
+              </a:spcBef>
+              <a:spcAft>
+                <a:spcPts val="0"/>
+              </a:spcAft>
+              <a:buClr>
+                <a:schemeClr val="accent1"/>
+              </a:buClr>
+              <a:buSzPct val="80000"/>
+              <a:buFont typeface="Wingdings 3" charset="2"/>
+              <a:buChar char=""/>
+              <a:defRPr sz="1200" kern="1200">
+                <a:solidFill>
+                  <a:schemeClr val="tx1">
+                    <a:lumMod val="75000"/>
+                    <a:lumOff val="25000"/>
+                  </a:schemeClr>
+                </a:solidFill>
+                <a:latin typeface="+mn-lt"/>
+                <a:ea typeface="+mn-ea"/>
+                <a:cs typeface="+mn-cs"/>
+              </a:defRPr>
+            </a:lvl5pPr>
+            <a:lvl6pPr marL="2514600" indent="-228600" algn="l" defTabSz="457200" rtl="0" eaLnBrk="1" latinLnBrk="0" hangingPunct="1">
+              <a:spcBef>
+                <a:spcPts val="1000"/>
+              </a:spcBef>
+              <a:spcAft>
+                <a:spcPts val="0"/>
+              </a:spcAft>
+              <a:buClr>
+                <a:schemeClr val="accent1"/>
+              </a:buClr>
+              <a:buSzPct val="80000"/>
+              <a:buFont typeface="Wingdings 3" charset="2"/>
+              <a:buChar char=""/>
+              <a:defRPr sz="1200" kern="1200">
+                <a:solidFill>
+                  <a:schemeClr val="tx1">
+                    <a:lumMod val="75000"/>
+                    <a:lumOff val="25000"/>
+                  </a:schemeClr>
+                </a:solidFill>
+                <a:latin typeface="+mn-lt"/>
+                <a:ea typeface="+mn-ea"/>
+                <a:cs typeface="+mn-cs"/>
+              </a:defRPr>
+            </a:lvl6pPr>
+            <a:lvl7pPr marL="2971800" indent="-228600" algn="l" defTabSz="457200" rtl="0" eaLnBrk="1" latinLnBrk="0" hangingPunct="1">
+              <a:spcBef>
+                <a:spcPts val="1000"/>
+              </a:spcBef>
+              <a:spcAft>
+                <a:spcPts val="0"/>
+              </a:spcAft>
+              <a:buClr>
+                <a:schemeClr val="accent1"/>
+              </a:buClr>
+              <a:buSzPct val="80000"/>
+              <a:buFont typeface="Wingdings 3" charset="2"/>
+              <a:buChar char=""/>
+              <a:defRPr sz="1200" kern="1200">
+                <a:solidFill>
+                  <a:schemeClr val="tx1">
+                    <a:lumMod val="75000"/>
+                    <a:lumOff val="25000"/>
+                  </a:schemeClr>
+                </a:solidFill>
+                <a:latin typeface="+mn-lt"/>
+                <a:ea typeface="+mn-ea"/>
+                <a:cs typeface="+mn-cs"/>
+              </a:defRPr>
+            </a:lvl7pPr>
+            <a:lvl8pPr marL="3429000" indent="-228600" algn="l" defTabSz="457200" rtl="0" eaLnBrk="1" latinLnBrk="0" hangingPunct="1">
+              <a:spcBef>
+                <a:spcPts val="1000"/>
+              </a:spcBef>
+              <a:spcAft>
+                <a:spcPts val="0"/>
+              </a:spcAft>
+              <a:buClr>
+                <a:schemeClr val="accent1"/>
+              </a:buClr>
+              <a:buSzPct val="80000"/>
+              <a:buFont typeface="Wingdings 3" charset="2"/>
+              <a:buChar char=""/>
+              <a:defRPr sz="1200" kern="1200">
+                <a:solidFill>
+                  <a:schemeClr val="tx1">
+                    <a:lumMod val="75000"/>
+                    <a:lumOff val="25000"/>
+                  </a:schemeClr>
+                </a:solidFill>
+                <a:latin typeface="+mn-lt"/>
+                <a:ea typeface="+mn-ea"/>
+                <a:cs typeface="+mn-cs"/>
+              </a:defRPr>
+            </a:lvl8pPr>
+            <a:lvl9pPr marL="3886200" indent="-228600" algn="l" defTabSz="457200" rtl="0" eaLnBrk="1" latinLnBrk="0" hangingPunct="1">
+              <a:spcBef>
+                <a:spcPts val="1000"/>
+              </a:spcBef>
+              <a:spcAft>
+                <a:spcPts val="0"/>
+              </a:spcAft>
+              <a:buClr>
+                <a:schemeClr val="accent1"/>
+              </a:buClr>
+              <a:buSzPct val="80000"/>
+              <a:buFont typeface="Wingdings 3" charset="2"/>
+              <a:buChar char=""/>
+              <a:defRPr sz="1200" kern="1200">
+                <a:solidFill>
+                  <a:schemeClr val="tx1">
+                    <a:lumMod val="75000"/>
+                    <a:lumOff val="25000"/>
+                  </a:schemeClr>
+                </a:solidFill>
+                <a:latin typeface="+mn-lt"/>
+                <a:ea typeface="+mn-ea"/>
+                <a:cs typeface="+mn-cs"/>
+              </a:defRPr>
+            </a:lvl9pPr>
+          </a:lstStyle>
+          <a:p>
+            <a:pPr marL="0" indent="0">
+              <a:buNone/>
+            </a:pPr>
+            <a:r>
+              <a:rPr lang="en-US" sz="1400" dirty="0"/>
+              <a:t>Major intervention</a:t>
+            </a:r>
+          </a:p>
+          <a:p>
+            <a:r>
+              <a:rPr lang="en-US" sz="1400" dirty="0"/>
+              <a:t>Restyling</a:t>
+            </a:r>
+          </a:p>
+          <a:p>
+            <a:r>
+              <a:rPr lang="en-US" sz="1400" dirty="0"/>
+              <a:t>Air layering</a:t>
+            </a:r>
+          </a:p>
+          <a:p>
+            <a:r>
+              <a:rPr lang="en-US" sz="1400" dirty="0"/>
+              <a:t>Deadwood</a:t>
+            </a:r>
           </a:p>
         </p:txBody>
       </p:sp>
@@ -14895,7 +15213,7 @@
           <a:p>
             <a:r>
               <a:rPr lang="en-US" sz="1600" dirty="0"/>
-              <a:t>Untangle lateral roots where poss. (esp. girdling roots</a:t>
+              <a:t>Untangle lateral roots where poss. (esp. girdling roots)</a:t>
             </a:r>
           </a:p>
           <a:p>
@@ -14939,13 +15257,13 @@
           <a:p>
             <a:r>
               <a:rPr lang="en-US" sz="1600" dirty="0"/>
-              <a:t>Clear growth from lower trunk</a:t>
+              <a:t>Clear any growth from lower trunk</a:t>
             </a:r>
           </a:p>
           <a:p>
             <a:r>
               <a:rPr lang="en-US" sz="1600" dirty="0"/>
-              <a:t>Spray with water if starting to dry</a:t>
+              <a:t>Spray with water if starting to dry!</a:t>
             </a:r>
             <a:br>
               <a:rPr lang="en-US" sz="1600" dirty="0"/>
@@ -14970,13 +15288,7 @@
           <a:p>
             <a:r>
               <a:rPr lang="en-US" sz="1600" dirty="0"/>
-              <a:t>Place root ball in pot</a:t>
-            </a:r>
-          </a:p>
-          <a:p>
-            <a:r>
-              <a:rPr lang="en-US" sz="1600" dirty="0"/>
-              <a:t>Pack soil around and over root ball</a:t>
+              <a:t>Place root ball in pot and pack soil around</a:t>
             </a:r>
           </a:p>
           <a:p>
@@ -14988,19 +15300,13 @@
           <a:p>
             <a:r>
               <a:rPr lang="en-GB" sz="1600" dirty="0"/>
-              <a:t>Pull guy wires over root ball, twist together tightly, and trim to 3-4 twists</a:t>
+              <a:t>Pull guy wires over root ball, twist pairs together tightly, and trim to 3-4 twists</a:t>
             </a:r>
           </a:p>
           <a:p>
             <a:r>
               <a:rPr lang="en-GB" sz="1600" dirty="0"/>
-              <a:t>Cover with grated, rehydrated sphagnum</a:t>
-            </a:r>
-          </a:p>
-          <a:p>
-            <a:r>
-              <a:rPr lang="en-GB" sz="1600" dirty="0"/>
-              <a:t>Compress sphagnum</a:t>
+              <a:t>Cover with dried, grated, rehydrated sphagnum and compress surface</a:t>
             </a:r>
           </a:p>
           <a:p>
@@ -19919,6 +20225,56 @@
           </a:p>
         </p:txBody>
       </p:sp>
+      <p:sp>
+        <p:nvSpPr>
+          <p:cNvPr id="5" name="Rectangle 4">
+            <a:extLst>
+              <a:ext uri="{FF2B5EF4-FFF2-40B4-BE49-F238E27FC236}">
+                <a16:creationId xmlns:a16="http://schemas.microsoft.com/office/drawing/2014/main" id="{887D0B46-1432-658B-8056-A13EA21670B8}"/>
+              </a:ext>
+            </a:extLst>
+          </p:cNvPr>
+          <p:cNvSpPr/>
+          <p:nvPr/>
+        </p:nvSpPr>
+        <p:spPr>
+          <a:xfrm>
+            <a:off x="7070912" y="414952"/>
+            <a:ext cx="3966882" cy="582653"/>
+          </a:xfrm>
+          <a:prstGeom prst="rect">
+            <a:avLst/>
+          </a:prstGeom>
+        </p:spPr>
+        <p:style>
+          <a:lnRef idx="2">
+            <a:schemeClr val="accent5">
+              <a:shade val="15000"/>
+            </a:schemeClr>
+          </a:lnRef>
+          <a:fillRef idx="1">
+            <a:schemeClr val="accent5"/>
+          </a:fillRef>
+          <a:effectRef idx="0">
+            <a:schemeClr val="accent5"/>
+          </a:effectRef>
+          <a:fontRef idx="minor">
+            <a:schemeClr val="lt1"/>
+          </a:fontRef>
+        </p:style>
+        <p:txBody>
+          <a:bodyPr rtlCol="0" anchor="ctr"/>
+          <a:lstStyle/>
+          <a:p>
+            <a:pPr algn="ctr"/>
+            <a:r>
+              <a:rPr lang="en-US" dirty="0"/>
+              <a:t>ACTIVELY MISLEADING</a:t>
+            </a:r>
+            <a:endParaRPr lang="en-GB" dirty="0"/>
+          </a:p>
+        </p:txBody>
+      </p:sp>
     </p:spTree>
     <p:extLst>
       <p:ext uri="{BB962C8B-B14F-4D97-AF65-F5344CB8AC3E}">
@@ -19929,6 +20285,11 @@
   <p:clrMapOvr>
     <a:masterClrMapping/>
   </p:clrMapOvr>
+  <p:extLst>
+    <p:ext uri="{6950BFC3-D8DA-4A85-94F7-54DA5524770B}">
+      <p188:commentRel xmlns:p188="http://schemas.microsoft.com/office/powerpoint/2018/8/main" r:id="rId2"/>
+    </p:ext>
+  </p:extLst>
 </p:sld>
 </file>
 

</xml_diff>

<commit_message>
Changed slide title bylines to sentence case; looks less awkward Misc fiddles
</commit_message>
<xml_diff>
--- a/WGCourse/Bonsai On A Budget (running).pptx
+++ b/WGCourse/Bonsai On A Budget (running).pptx
@@ -154,6 +154,27 @@
         <a:r>
           <a:rPr lang="en-GB"/>
           <a:t>Need to add a "why study bonsai" slide prior to this.  (Also including definition of bonsai over from "Art &amp; Science" slide.)</a:t>
+        </a:r>
+      </a:p>
+    </p188:txBody>
+  </p188:cm>
+</p188:cmLst>
+</file>
+
+<file path=ppt/comments/modernComment_10F_5618718E.xml><?xml version="1.0" encoding="utf-8"?>
+<p188:cmLst xmlns:a="http://schemas.openxmlformats.org/drawingml/2006/main" xmlns:r="http://schemas.openxmlformats.org/officeDocument/2006/relationships" xmlns:p188="http://schemas.microsoft.com/office/powerpoint/2018/8/main">
+  <p188:cm id="{F25F6F03-D7DA-4A10-869B-00E3B9FE43D7}" authorId="{49000DBD-DD57-B9F5-1E22-669DF19DD1E1}" created="2024-06-02T19:12:15.201">
+    <pc:sldMkLst xmlns:pc="http://schemas.microsoft.com/office/powerpoint/2013/main/command">
+      <pc:docMk/>
+      <pc:sldMk cId="1444442510" sldId="271"/>
+    </pc:sldMkLst>
+    <p188:txBody>
+      <a:bodyPr/>
+      <a:lstStyle/>
+      <a:p>
+        <a:r>
+          <a:rPr lang="en-GB"/>
+          <a:t>Add "Japanophilia 101" predecessor slide to cover wabi-sabi etc?</a:t>
         </a:r>
       </a:p>
     </p188:txBody>
@@ -6125,7 +6146,7 @@
             </a:br>
             <a:r>
               <a:rPr lang="en-US" sz="2800" dirty="0"/>
-              <a:t>What Makes A Tree Look Mature?</a:t>
+              <a:t>What makes a tree look mature?</a:t>
             </a:r>
             <a:endParaRPr lang="en-GB" sz="2800" dirty="0"/>
           </a:p>
@@ -6747,7 +6768,7 @@
             </a:br>
             <a:r>
               <a:rPr lang="en-US" sz="2800" dirty="0"/>
-              <a:t>What Makes A Tree Stand Out?</a:t>
+              <a:t>What makes a tree stand out?</a:t>
             </a:r>
             <a:endParaRPr lang="en-GB" sz="2800" dirty="0"/>
           </a:p>
@@ -7176,7 +7197,7 @@
           <p:nvPr/>
         </p:nvPicPr>
         <p:blipFill>
-          <a:blip r:embed="rId2" cstate="screen">
+          <a:blip r:embed="rId3" cstate="screen">
             <a:extLst>
               <a:ext uri="{28A0092B-C50C-407E-A947-70E740481C1C}">
                 <a14:useLocalDpi xmlns:a14="http://schemas.microsoft.com/office/drawing/2010/main"/>
@@ -7257,6 +7278,11 @@
   <p:clrMapOvr>
     <a:masterClrMapping/>
   </p:clrMapOvr>
+  <p:extLst>
+    <p:ext uri="{6950BFC3-D8DA-4A85-94F7-54DA5524770B}">
+      <p188:commentRel xmlns:p188="http://schemas.microsoft.com/office/powerpoint/2018/8/main" r:id="rId2"/>
+    </p:ext>
+  </p:extLst>
 </p:sld>
 </file>
 
@@ -7370,7 +7396,7 @@
             </a:br>
             <a:r>
               <a:rPr lang="en-US" sz="2800" dirty="0"/>
-              <a:t>What Gives The Game Away?</a:t>
+              <a:t>What gives the game away?</a:t>
             </a:r>
             <a:endParaRPr lang="en-GB" sz="2800" dirty="0"/>
           </a:p>
@@ -8143,6 +8169,18 @@
             <a:br>
               <a:rPr lang="en-US" dirty="0"/>
             </a:br>
+            <a:r>
+              <a:rPr lang="en-US" sz="2800" dirty="0"/>
+              <a:t>The most common four of… </a:t>
+            </a:r>
+            <a:r>
+              <a:rPr lang="en-US" sz="2800" i="1" dirty="0"/>
+              <a:t>thirty?</a:t>
+            </a:r>
+            <a:r>
+              <a:rPr lang="en-US" sz="2800" dirty="0"/>
+              <a:t>  Really?!?</a:t>
+            </a:r>
             <a:endParaRPr lang="en-GB" sz="2800" dirty="0"/>
           </a:p>
         </p:txBody>
@@ -10636,8 +10674,8 @@
         </p:nvSpPr>
         <p:spPr>
           <a:xfrm flipV="1">
-            <a:off x="6037929" y="2949978"/>
-            <a:ext cx="938369" cy="886741"/>
+            <a:off x="6081707" y="2949975"/>
+            <a:ext cx="850814" cy="684336"/>
           </a:xfrm>
           <a:prstGeom prst="trapezoid">
             <a:avLst>
@@ -10983,7 +11021,11 @@
             </a:pathLst>
           </a:custGeom>
           <a:noFill/>
-          <a:ln w="88900"/>
+          <a:ln w="88900">
+            <a:solidFill>
+              <a:srgbClr val="996633"/>
+            </a:solidFill>
+          </a:ln>
         </p:spPr>
         <p:style>
           <a:lnRef idx="2">
@@ -11742,12 +11784,22 @@
             </a:r>
           </a:p>
           <a:p>
+            <a:pPr>
+              <a:spcBef>
+                <a:spcPts val="300"/>
+              </a:spcBef>
+            </a:pPr>
             <a:r>
               <a:rPr lang="en-US" sz="1400" dirty="0"/>
               <a:t>Seeds</a:t>
             </a:r>
           </a:p>
           <a:p>
+            <a:pPr>
+              <a:spcBef>
+                <a:spcPts val="300"/>
+              </a:spcBef>
+            </a:pPr>
             <a:r>
               <a:rPr lang="en-US" sz="1400" dirty="0"/>
               <a:t>Cuttings</a:t>
@@ -11763,12 +11815,22 @@
             </a:r>
           </a:p>
           <a:p>
+            <a:pPr>
+              <a:spcBef>
+                <a:spcPts val="300"/>
+              </a:spcBef>
+            </a:pPr>
             <a:r>
               <a:rPr lang="en-GB" sz="1400" dirty="0"/>
               <a:t>Garden centre seedlings</a:t>
             </a:r>
           </a:p>
           <a:p>
+            <a:pPr>
+              <a:spcBef>
+                <a:spcPts val="300"/>
+              </a:spcBef>
+            </a:pPr>
             <a:r>
               <a:rPr lang="en-GB" sz="1400" dirty="0"/>
               <a:t>Scavenging</a:t>
@@ -11784,6 +11846,11 @@
             </a:r>
           </a:p>
           <a:p>
+            <a:pPr>
+              <a:spcBef>
+                <a:spcPts val="300"/>
+              </a:spcBef>
+            </a:pPr>
             <a:r>
               <a:rPr lang="en-GB" sz="1400" dirty="0"/>
               <a:t>“</a:t>
@@ -11798,12 +11865,22 @@
             </a:r>
           </a:p>
           <a:p>
+            <a:pPr>
+              <a:spcBef>
+                <a:spcPts val="300"/>
+              </a:spcBef>
+            </a:pPr>
             <a:r>
               <a:rPr lang="en-GB" sz="1400" dirty="0"/>
               <a:t>Garden centre mature trees</a:t>
             </a:r>
           </a:p>
           <a:p>
+            <a:pPr>
+              <a:spcBef>
+                <a:spcPts val="300"/>
+              </a:spcBef>
+            </a:pPr>
             <a:r>
               <a:rPr lang="en-GB" sz="1400" dirty="0" err="1"/>
               <a:t>Yamadori</a:t>
@@ -14692,12 +14769,22 @@
             </a:r>
           </a:p>
           <a:p>
+            <a:pPr>
+              <a:spcBef>
+                <a:spcPts val="300"/>
+              </a:spcBef>
+            </a:pPr>
             <a:r>
               <a:rPr lang="en-US" sz="1400" dirty="0"/>
               <a:t>Exhibition</a:t>
             </a:r>
           </a:p>
           <a:p>
+            <a:pPr>
+              <a:spcBef>
+                <a:spcPts val="300"/>
+              </a:spcBef>
+            </a:pPr>
             <a:r>
               <a:rPr lang="en-US" sz="1400" dirty="0"/>
               <a:t>Photography</a:t>
@@ -14721,8 +14808,8 @@
         </p:nvSpPr>
         <p:spPr>
           <a:xfrm>
-            <a:off x="5670351" y="5400459"/>
-            <a:ext cx="2025420" cy="1368905"/>
+            <a:off x="5723126" y="5487637"/>
+            <a:ext cx="2025420" cy="1162298"/>
           </a:xfrm>
           <a:prstGeom prst="rect">
             <a:avLst/>
@@ -14969,18 +15056,33 @@
             </a:r>
           </a:p>
           <a:p>
+            <a:pPr>
+              <a:spcBef>
+                <a:spcPts val="300"/>
+              </a:spcBef>
+            </a:pPr>
             <a:r>
               <a:rPr lang="en-US" sz="1400" dirty="0"/>
               <a:t>Restyling</a:t>
             </a:r>
           </a:p>
           <a:p>
+            <a:pPr>
+              <a:spcBef>
+                <a:spcPts val="300"/>
+              </a:spcBef>
+            </a:pPr>
             <a:r>
               <a:rPr lang="en-US" sz="1400" dirty="0"/>
               <a:t>Air layering</a:t>
             </a:r>
           </a:p>
           <a:p>
+            <a:pPr>
+              <a:spcBef>
+                <a:spcPts val="300"/>
+              </a:spcBef>
+            </a:pPr>
             <a:r>
               <a:rPr lang="en-US" sz="1400" dirty="0"/>
               <a:t>Deadwood</a:t>
@@ -15140,8 +15242,17 @@
               <a:buNone/>
             </a:pPr>
             <a:r>
+              <a:rPr lang="en-US" sz="1600" dirty="0"/>
+              <a:t>Regular repotting – often back into the same pot! - helps limit tree size via “root-to-shoot ratio”</a:t>
+            </a:r>
+          </a:p>
+          <a:p>
+            <a:pPr marL="0" indent="0">
+              <a:buNone/>
+            </a:pPr>
+            <a:r>
               <a:rPr lang="en-US" dirty="0"/>
-              <a:t>Prepare pot</a:t>
+              <a:t>1. Prepare pot</a:t>
             </a:r>
           </a:p>
           <a:p>
@@ -15178,7 +15289,7 @@
             </a:pPr>
             <a:r>
               <a:rPr lang="en-US" dirty="0"/>
-              <a:t>Prepare tree</a:t>
+              <a:t>2. Prepare tree</a:t>
             </a:r>
           </a:p>
           <a:p>
@@ -15209,15 +15320,6 @@
               <a:rPr lang="en-US" sz="1600" dirty="0"/>
               <a:t>Dig up / in to define root-ball</a:t>
             </a:r>
-          </a:p>
-          <a:p>
-            <a:r>
-              <a:rPr lang="en-US" sz="1600" dirty="0"/>
-              <a:t>Untangle lateral roots where poss. (esp. girdling roots)</a:t>
-            </a:r>
-          </a:p>
-          <a:p>
-            <a:endParaRPr lang="en-US" sz="1600" dirty="0"/>
           </a:p>
           <a:p>
             <a:pPr marL="0" indent="0">
@@ -15257,6 +15359,12 @@
           <a:p>
             <a:r>
               <a:rPr lang="en-US" sz="1600" dirty="0"/>
+              <a:t>Untangle lateral roots where poss. (esp. girdling roots)</a:t>
+            </a:r>
+          </a:p>
+          <a:p>
+            <a:r>
+              <a:rPr lang="en-US" sz="1600" dirty="0"/>
               <a:t>Clear any growth from lower trunk</a:t>
             </a:r>
           </a:p>
@@ -15276,7 +15384,7 @@
             </a:pPr>
             <a:r>
               <a:rPr lang="en-US" dirty="0"/>
-              <a:t>Insert tree into pot</a:t>
+              <a:t>3. Insert tree into pot</a:t>
             </a:r>
           </a:p>
           <a:p>
@@ -15314,6 +15422,63 @@
               <a:rPr lang="en-GB" sz="1600" dirty="0"/>
               <a:t>Sprinkle with grated acrocarpous (upward-growing) moss</a:t>
             </a:r>
+          </a:p>
+        </p:txBody>
+      </p:sp>
+      <p:sp>
+        <p:nvSpPr>
+          <p:cNvPr id="5" name="Rectangle 4">
+            <a:extLst>
+              <a:ext uri="{FF2B5EF4-FFF2-40B4-BE49-F238E27FC236}">
+                <a16:creationId xmlns:a16="http://schemas.microsoft.com/office/drawing/2014/main" id="{1BE6A9F3-573D-268C-CBAD-FD3B8A172BB3}"/>
+              </a:ext>
+            </a:extLst>
+          </p:cNvPr>
+          <p:cNvSpPr/>
+          <p:nvPr/>
+        </p:nvSpPr>
+        <p:spPr>
+          <a:xfrm>
+            <a:off x="7070912" y="372088"/>
+            <a:ext cx="3966882" cy="582653"/>
+          </a:xfrm>
+          <a:prstGeom prst="rect">
+            <a:avLst/>
+          </a:prstGeom>
+        </p:spPr>
+        <p:style>
+          <a:lnRef idx="2">
+            <a:schemeClr val="accent3">
+              <a:shade val="15000"/>
+            </a:schemeClr>
+          </a:lnRef>
+          <a:fillRef idx="1">
+            <a:schemeClr val="accent3"/>
+          </a:fillRef>
+          <a:effectRef idx="0">
+            <a:schemeClr val="accent3"/>
+          </a:effectRef>
+          <a:fontRef idx="minor">
+            <a:schemeClr val="lt1"/>
+          </a:fontRef>
+        </p:style>
+        <p:txBody>
+          <a:bodyPr rtlCol="0" anchor="ctr"/>
+          <a:lstStyle/>
+          <a:p>
+            <a:pPr algn="ctr"/>
+            <a:r>
+              <a:rPr lang="en-US" dirty="0"/>
+              <a:t>Currently a quick summary</a:t>
+            </a:r>
+            <a:br>
+              <a:rPr lang="en-US" dirty="0"/>
+            </a:br>
+            <a:r>
+              <a:rPr lang="en-US" dirty="0"/>
+              <a:t>Desperately needs diagrams</a:t>
+            </a:r>
+            <a:endParaRPr lang="en-GB" dirty="0"/>
           </a:p>
         </p:txBody>
       </p:sp>
@@ -28273,7 +28438,7 @@
             <a:pPr algn="ctr"/>
             <a:r>
               <a:rPr lang="en-US" sz="1400" dirty="0"/>
-              <a:t>!</a:t>
+              <a:t>B</a:t>
             </a:r>
             <a:endParaRPr lang="en-GB" sz="1400" dirty="0"/>
           </a:p>
@@ -33030,7 +33195,7 @@
             </a:br>
             <a:r>
               <a:rPr lang="en-US" sz="2800" dirty="0"/>
-              <a:t>(Trick Question Alert!)</a:t>
+              <a:t>(Trick question alert!)</a:t>
             </a:r>
             <a:endParaRPr lang="en-GB" sz="2800" dirty="0"/>
           </a:p>
@@ -33640,7 +33805,7 @@
             </a:br>
             <a:r>
               <a:rPr lang="en-US" sz="2800" dirty="0"/>
-              <a:t>What A Bonsai Needs To Survive</a:t>
+              <a:t>What a bonsai needs to survive</a:t>
             </a:r>
             <a:endParaRPr lang="en-GB" sz="2800" dirty="0"/>
           </a:p>
@@ -34105,14 +34270,14 @@
           <a:p>
             <a:r>
               <a:rPr lang="en-US" dirty="0"/>
-              <a:t>Silvics 101</a:t>
+              <a:t>Arboriculture 101</a:t>
             </a:r>
             <a:br>
               <a:rPr lang="en-US" dirty="0"/>
             </a:br>
             <a:r>
               <a:rPr lang="en-US" sz="2800" dirty="0"/>
-              <a:t>What Shapes A Tree</a:t>
+              <a:t>What shapes a tree?</a:t>
             </a:r>
             <a:endParaRPr lang="en-GB" sz="2800" dirty="0"/>
           </a:p>

</xml_diff>

<commit_message>
Fixed three-way taijitu diagram to *not* have a chunk out of the top-right corner
</commit_message>
<xml_diff>
--- a/WGCourse/Bonsai On A Budget (running).pptx
+++ b/WGCourse/Bonsai On A Budget (running).pptx
@@ -929,7 +929,7 @@
             <a:fld id="{B61BEF0D-F0BB-DE4B-95CE-6DB70DBA9567}" type="datetimeFigureOut">
               <a:rPr lang="en-US" smtClean="0"/>
               <a:pPr/>
-              <a:t>6/2/2024</a:t>
+              <a:t>6/5/2024</a:t>
             </a:fld>
             <a:endParaRPr lang="en-US" dirty="0"/>
           </a:p>
@@ -1182,7 +1182,7 @@
             <a:fld id="{B61BEF0D-F0BB-DE4B-95CE-6DB70DBA9567}" type="datetimeFigureOut">
               <a:rPr lang="en-US" smtClean="0"/>
               <a:pPr/>
-              <a:t>6/2/2024</a:t>
+              <a:t>6/5/2024</a:t>
             </a:fld>
             <a:endParaRPr lang="en-US" dirty="0"/>
           </a:p>
@@ -1498,7 +1498,7 @@
             <a:fld id="{B61BEF0D-F0BB-DE4B-95CE-6DB70DBA9567}" type="datetimeFigureOut">
               <a:rPr lang="en-US" smtClean="0"/>
               <a:pPr/>
-              <a:t>6/2/2024</a:t>
+              <a:t>6/5/2024</a:t>
             </a:fld>
             <a:endParaRPr lang="en-US" dirty="0"/>
           </a:p>
@@ -1841,7 +1841,7 @@
             <a:fld id="{B61BEF0D-F0BB-DE4B-95CE-6DB70DBA9567}" type="datetimeFigureOut">
               <a:rPr lang="en-US" smtClean="0"/>
               <a:pPr/>
-              <a:t>6/2/2024</a:t>
+              <a:t>6/5/2024</a:t>
             </a:fld>
             <a:endParaRPr lang="en-US" dirty="0"/>
           </a:p>
@@ -2157,7 +2157,7 @@
             <a:fld id="{B61BEF0D-F0BB-DE4B-95CE-6DB70DBA9567}" type="datetimeFigureOut">
               <a:rPr lang="en-US" smtClean="0"/>
               <a:pPr/>
-              <a:t>6/2/2024</a:t>
+              <a:t>6/5/2024</a:t>
             </a:fld>
             <a:endParaRPr lang="en-US" dirty="0"/>
           </a:p>
@@ -2552,7 +2552,7 @@
             <a:fld id="{B61BEF0D-F0BB-DE4B-95CE-6DB70DBA9567}" type="datetimeFigureOut">
               <a:rPr lang="en-US" smtClean="0"/>
               <a:pPr/>
-              <a:t>6/2/2024</a:t>
+              <a:t>6/5/2024</a:t>
             </a:fld>
             <a:endParaRPr lang="en-US" dirty="0"/>
           </a:p>
@@ -2723,7 +2723,7 @@
           <a:p>
             <a:fld id="{55C6B4A9-1611-4792-9094-5F34BCA07E0B}" type="datetimeFigureOut">
               <a:rPr lang="en-US" smtClean="0"/>
-              <a:t>6/2/2024</a:t>
+              <a:t>6/5/2024</a:t>
             </a:fld>
             <a:endParaRPr lang="en-US" dirty="0"/>
           </a:p>
@@ -2904,7 +2904,7 @@
             <a:fld id="{B61BEF0D-F0BB-DE4B-95CE-6DB70DBA9567}" type="datetimeFigureOut">
               <a:rPr lang="en-US" smtClean="0"/>
               <a:pPr/>
-              <a:t>6/2/2024</a:t>
+              <a:t>6/5/2024</a:t>
             </a:fld>
             <a:endParaRPr lang="en-US" dirty="0"/>
           </a:p>
@@ -3082,7 +3082,7 @@
             <a:fld id="{B61BEF0D-F0BB-DE4B-95CE-6DB70DBA9567}" type="datetimeFigureOut">
               <a:rPr lang="en-US" smtClean="0"/>
               <a:pPr/>
-              <a:t>6/2/2024</a:t>
+              <a:t>6/5/2024</a:t>
             </a:fld>
             <a:endParaRPr lang="en-US" dirty="0"/>
           </a:p>
@@ -3331,7 +3331,7 @@
             <a:fld id="{B61BEF0D-F0BB-DE4B-95CE-6DB70DBA9567}" type="datetimeFigureOut">
               <a:rPr lang="en-US" smtClean="0"/>
               <a:pPr/>
-              <a:t>6/2/2024</a:t>
+              <a:t>6/5/2024</a:t>
             </a:fld>
             <a:endParaRPr lang="en-US" dirty="0"/>
           </a:p>
@@ -3564,7 +3564,7 @@
           <a:p>
             <a:fld id="{EB712588-04B1-427B-82EE-E8DB90309F08}" type="datetimeFigureOut">
               <a:rPr lang="en-US" smtClean="0"/>
-              <a:t>6/2/2024</a:t>
+              <a:t>6/5/2024</a:t>
             </a:fld>
             <a:endParaRPr lang="en-US" dirty="0"/>
           </a:p>
@@ -3939,7 +3939,7 @@
             <a:fld id="{B61BEF0D-F0BB-DE4B-95CE-6DB70DBA9567}" type="datetimeFigureOut">
               <a:rPr lang="en-US" smtClean="0"/>
               <a:pPr/>
-              <a:t>6/2/2024</a:t>
+              <a:t>6/5/2024</a:t>
             </a:fld>
             <a:endParaRPr lang="en-US" dirty="0"/>
           </a:p>
@@ -4064,7 +4064,7 @@
             <a:fld id="{B61BEF0D-F0BB-DE4B-95CE-6DB70DBA9567}" type="datetimeFigureOut">
               <a:rPr lang="en-US" smtClean="0"/>
               <a:pPr/>
-              <a:t>6/2/2024</a:t>
+              <a:t>6/5/2024</a:t>
             </a:fld>
             <a:endParaRPr lang="en-US" dirty="0"/>
           </a:p>
@@ -4161,7 +4161,7 @@
             <a:fld id="{B61BEF0D-F0BB-DE4B-95CE-6DB70DBA9567}" type="datetimeFigureOut">
               <a:rPr lang="en-US" smtClean="0"/>
               <a:pPr/>
-              <a:t>6/2/2024</a:t>
+              <a:t>6/5/2024</a:t>
             </a:fld>
             <a:endParaRPr lang="en-US" dirty="0"/>
           </a:p>
@@ -4417,7 +4417,7 @@
           <a:p>
             <a:fld id="{42A54C80-263E-416B-A8E0-580EDEADCBDC}" type="datetimeFigureOut">
               <a:rPr lang="en-US" smtClean="0"/>
-              <a:t>6/2/2024</a:t>
+              <a:t>6/5/2024</a:t>
             </a:fld>
             <a:endParaRPr lang="en-US" dirty="0"/>
           </a:p>
@@ -4681,7 +4681,7 @@
             <a:fld id="{B61BEF0D-F0BB-DE4B-95CE-6DB70DBA9567}" type="datetimeFigureOut">
               <a:rPr lang="en-US" smtClean="0"/>
               <a:pPr/>
-              <a:t>6/2/2024</a:t>
+              <a:t>6/5/2024</a:t>
             </a:fld>
             <a:endParaRPr lang="en-US" dirty="0"/>
           </a:p>
@@ -5426,7 +5426,7 @@
             <a:fld id="{B61BEF0D-F0BB-DE4B-95CE-6DB70DBA9567}" type="datetimeFigureOut">
               <a:rPr lang="en-US" smtClean="0"/>
               <a:pPr/>
-              <a:t>6/2/2024</a:t>
+              <a:t>6/5/2024</a:t>
             </a:fld>
             <a:endParaRPr lang="en-US" dirty="0"/>
           </a:p>
@@ -32902,36 +32902,6 @@
           </a:p>
         </p:txBody>
       </p:sp>
-      <p:pic>
-        <p:nvPicPr>
-          <p:cNvPr id="8" name="Picture 7">
-            <a:extLst>
-              <a:ext uri="{FF2B5EF4-FFF2-40B4-BE49-F238E27FC236}">
-                <a16:creationId xmlns:a16="http://schemas.microsoft.com/office/drawing/2014/main" id="{BBBFBEA1-CE32-6236-6085-AB1B64292E5D}"/>
-              </a:ext>
-            </a:extLst>
-          </p:cNvPr>
-          <p:cNvPicPr>
-            <a:picLocks noChangeAspect="1"/>
-          </p:cNvPicPr>
-          <p:nvPr/>
-        </p:nvPicPr>
-        <p:blipFill>
-          <a:blip r:embed="rId2"/>
-          <a:stretch>
-            <a:fillRect/>
-          </a:stretch>
-        </p:blipFill>
-        <p:spPr>
-          <a:xfrm>
-            <a:off x="5865407" y="1494644"/>
-            <a:ext cx="4672865" cy="4659627"/>
-          </a:xfrm>
-          <a:prstGeom prst="rect">
-            <a:avLst/>
-          </a:prstGeom>
-        </p:spPr>
-      </p:pic>
       <p:sp>
         <p:nvSpPr>
           <p:cNvPr id="10" name="Rectangle 9">
@@ -32982,6 +32952,36 @@
           </a:p>
         </p:txBody>
       </p:sp>
+      <p:pic>
+        <p:nvPicPr>
+          <p:cNvPr id="6" name="Picture 5">
+            <a:extLst>
+              <a:ext uri="{FF2B5EF4-FFF2-40B4-BE49-F238E27FC236}">
+                <a16:creationId xmlns:a16="http://schemas.microsoft.com/office/drawing/2014/main" id="{633D940F-928E-4F3F-1A35-15843355581E}"/>
+              </a:ext>
+            </a:extLst>
+          </p:cNvPr>
+          <p:cNvPicPr>
+            <a:picLocks noChangeAspect="1"/>
+          </p:cNvPicPr>
+          <p:nvPr/>
+        </p:nvPicPr>
+        <p:blipFill>
+          <a:blip r:embed="rId2"/>
+          <a:stretch>
+            <a:fillRect/>
+          </a:stretch>
+        </p:blipFill>
+        <p:spPr>
+          <a:xfrm>
+            <a:off x="6096000" y="1896035"/>
+            <a:ext cx="4070047" cy="4058517"/>
+          </a:xfrm>
+          <a:prstGeom prst="rect">
+            <a:avLst/>
+          </a:prstGeom>
+        </p:spPr>
+      </p:pic>
     </p:spTree>
     <p:extLst>
       <p:ext uri="{BB962C8B-B14F-4D97-AF65-F5344CB8AC3E}">

</xml_diff>

<commit_message>
Added technical definition of "tree"
</commit_message>
<xml_diff>
--- a/WGCourse/Bonsai On A Budget (running).pptx
+++ b/WGCourse/Bonsai On A Budget (running).pptx
@@ -11367,57 +11367,6 @@
       </p:grpSpPr>
       <p:sp>
         <p:nvSpPr>
-          <p:cNvPr id="25" name="Isosceles Triangle 24">
-            <a:extLst>
-              <a:ext uri="{FF2B5EF4-FFF2-40B4-BE49-F238E27FC236}">
-                <a16:creationId xmlns:a16="http://schemas.microsoft.com/office/drawing/2014/main" id="{64841AEB-06AF-20C1-66BB-4098825498BB}"/>
-              </a:ext>
-            </a:extLst>
-          </p:cNvPr>
-          <p:cNvSpPr/>
-          <p:nvPr/>
-        </p:nvSpPr>
-        <p:spPr>
-          <a:xfrm>
-            <a:off x="1426179" y="5093118"/>
-            <a:ext cx="933769" cy="293710"/>
-          </a:xfrm>
-          <a:prstGeom prst="triangle">
-            <a:avLst>
-              <a:gd name="adj" fmla="val 69756"/>
-            </a:avLst>
-          </a:prstGeom>
-          <a:ln>
-            <a:noFill/>
-          </a:ln>
-        </p:spPr>
-        <p:style>
-          <a:lnRef idx="2">
-            <a:schemeClr val="accent1">
-              <a:shade val="15000"/>
-            </a:schemeClr>
-          </a:lnRef>
-          <a:fillRef idx="1">
-            <a:schemeClr val="accent1"/>
-          </a:fillRef>
-          <a:effectRef idx="0">
-            <a:schemeClr val="accent1"/>
-          </a:effectRef>
-          <a:fontRef idx="minor">
-            <a:schemeClr val="lt1"/>
-          </a:fontRef>
-        </p:style>
-        <p:txBody>
-          <a:bodyPr rtlCol="0" anchor="ctr"/>
-          <a:lstStyle/>
-          <a:p>
-            <a:pPr algn="ctr"/>
-            <a:endParaRPr lang="en-GB"/>
-          </a:p>
-        </p:txBody>
-      </p:sp>
-      <p:sp>
-        <p:nvSpPr>
           <p:cNvPr id="24" name="Isosceles Triangle 23">
             <a:extLst>
               <a:ext uri="{FF2B5EF4-FFF2-40B4-BE49-F238E27FC236}">
@@ -14644,6 +14593,57 @@
               <a:t>Good enough</a:t>
             </a:r>
             <a:endParaRPr lang="en-GB" dirty="0"/>
+          </a:p>
+        </p:txBody>
+      </p:sp>
+      <p:sp>
+        <p:nvSpPr>
+          <p:cNvPr id="25" name="Isosceles Triangle 24">
+            <a:extLst>
+              <a:ext uri="{FF2B5EF4-FFF2-40B4-BE49-F238E27FC236}">
+                <a16:creationId xmlns:a16="http://schemas.microsoft.com/office/drawing/2014/main" id="{64841AEB-06AF-20C1-66BB-4098825498BB}"/>
+              </a:ext>
+            </a:extLst>
+          </p:cNvPr>
+          <p:cNvSpPr/>
+          <p:nvPr/>
+        </p:nvSpPr>
+        <p:spPr>
+          <a:xfrm>
+            <a:off x="1426179" y="5093118"/>
+            <a:ext cx="933769" cy="293710"/>
+          </a:xfrm>
+          <a:prstGeom prst="triangle">
+            <a:avLst>
+              <a:gd name="adj" fmla="val 69756"/>
+            </a:avLst>
+          </a:prstGeom>
+          <a:ln>
+            <a:noFill/>
+          </a:ln>
+        </p:spPr>
+        <p:style>
+          <a:lnRef idx="2">
+            <a:schemeClr val="accent1">
+              <a:shade val="15000"/>
+            </a:schemeClr>
+          </a:lnRef>
+          <a:fillRef idx="1">
+            <a:schemeClr val="accent1"/>
+          </a:fillRef>
+          <a:effectRef idx="0">
+            <a:schemeClr val="accent1"/>
+          </a:effectRef>
+          <a:fontRef idx="minor">
+            <a:schemeClr val="lt1"/>
+          </a:fontRef>
+        </p:style>
+        <p:txBody>
+          <a:bodyPr rtlCol="0" anchor="ctr"/>
+          <a:lstStyle/>
+          <a:p>
+            <a:pPr algn="ctr"/>
+            <a:endParaRPr lang="en-GB"/>
           </a:p>
         </p:txBody>
       </p:sp>
@@ -36532,8 +36532,8 @@
         </p:nvSpPr>
         <p:spPr>
           <a:xfrm>
-            <a:off x="677333" y="1583214"/>
-            <a:ext cx="10107207" cy="5274785"/>
+            <a:off x="677333" y="1583215"/>
+            <a:ext cx="10107207" cy="4902698"/>
           </a:xfrm>
         </p:spPr>
         <p:txBody>
@@ -36603,17 +36603,12 @@
               <a:rPr lang="en-US" dirty="0"/>
               <a:t>Heavily impacted by Mao’s Cultural Revolution: seen as a bourgeois pastime</a:t>
             </a:r>
+            <a:endParaRPr lang="en-US" b="1" dirty="0"/>
           </a:p>
           <a:p>
             <a:pPr marL="0" indent="0">
               <a:buNone/>
             </a:pPr>
-            <a:endParaRPr lang="en-US" b="1" dirty="0"/>
-          </a:p>
-          <a:p>
-            <a:pPr marL="0" indent="0">
-              <a:buNone/>
-            </a:pPr>
             <a:r>
               <a:rPr lang="en-US" b="1" dirty="0"/>
               <a:t>Japan</a:t>
@@ -36646,11 +36641,21 @@
             </a:r>
             <a:r>
               <a:rPr lang="ja-JP" altLang="en-US" dirty="0"/>
-              <a:t>盆栽</a:t>
+              <a:t>盆栽 </a:t>
+            </a:r>
+            <a:r>
+              <a:rPr lang="en-US" altLang="ja-JP" dirty="0"/>
+              <a:t>– “tray planting”</a:t>
             </a:r>
             <a:r>
               <a:rPr lang="en-US" dirty="0"/>
-              <a:t>) adopted; development of distinct styles (dramatic archetypes)</a:t>
+              <a:t>) adopted</a:t>
+            </a:r>
+          </a:p>
+          <a:p>
+            <a:r>
+              <a:rPr lang="en-US" dirty="0"/>
+              <a:t>Development of distinct styles (dramatic archetypes)</a:t>
             </a:r>
           </a:p>
           <a:p>
@@ -36662,7 +36667,7 @@
           <a:p>
             <a:r>
               <a:rPr lang="en-US" dirty="0"/>
-              <a:t>Exported to West (USA, Europe) from 1960s onwards, in parallel with Japan’s “economic miracle”</a:t>
+              <a:t>Exported to West from 1960s onwards, in parallel with Japan’s “economic miracle”</a:t>
             </a:r>
           </a:p>
           <a:p>
@@ -37250,17 +37255,27 @@
         </p:nvSpPr>
         <p:spPr>
           <a:xfrm>
-            <a:off x="677334" y="1896035"/>
-            <a:ext cx="4943538" cy="4612342"/>
+            <a:off x="677334" y="1896034"/>
+            <a:ext cx="5163668" cy="4961966"/>
           </a:xfrm>
         </p:spPr>
         <p:txBody>
-          <a:bodyPr/>
+          <a:bodyPr>
+            <a:normAutofit lnSpcReduction="10000"/>
+          </a:bodyPr>
           <a:lstStyle/>
           <a:p>
             <a:r>
               <a:rPr lang="en-US" dirty="0"/>
-              <a:t>“Tree”: a woody plant that can reach 20ft on a single unsupported trunk</a:t>
+              <a:t>Tree: “</a:t>
+            </a:r>
+            <a:r>
+              <a:rPr lang="en-US" i="1" dirty="0"/>
+              <a:t>a large, tall, woody, perennial plant with a single, unbranched, erect, self-supporting stem holding an elevated and distinct crown of branches with a total height greater than ten feet and a diameter greater than three inches</a:t>
+            </a:r>
+            <a:r>
+              <a:rPr lang="en-US" dirty="0"/>
+              <a:t>” – oy vey!</a:t>
             </a:r>
           </a:p>
           <a:p>
@@ -37987,7 +38002,7 @@
             <a:pPr lvl="1"/>
             <a:r>
               <a:rPr lang="en-GB" dirty="0"/>
-              <a:t>Animals: spider mites, aphids, caterpillars, vine weevil, squirrels</a:t>
+              <a:t>Animals: spider mites, scale bugs, aphids, caterpillars, vine weevil, squirrels</a:t>
             </a:r>
           </a:p>
           <a:p>

</xml_diff>